<commit_message>
[Finishgood MA] - Revisi Quality Report Data
</commit_message>
<xml_diff>
--- a/my/Asset/ManualBook/Traceability.pptx
+++ b/my/Asset/ManualBook/Traceability.pptx
@@ -242,7 +242,7 @@
           <a:p>
             <a:fld id="{C879FF4A-6F57-4533-BF16-168B1394804A}" type="datetimeFigureOut">
               <a:rPr kumimoji="1" lang="ja-JP" altLang="en-US" smtClean="0"/>
-              <a:t>2019/4/12</a:t>
+              <a:t>2019/4/15</a:t>
             </a:fld>
             <a:endParaRPr kumimoji="1" lang="ja-JP" altLang="en-US"/>
           </a:p>
@@ -7190,7 +7190,6 @@
               <a:rPr lang="en-US" dirty="0" smtClean="0"/>
               <a:t>FIFO</a:t>
             </a:r>
-            <a:endParaRPr lang="en-US" dirty="0" smtClean="0"/>
           </a:p>
           <a:p>
             <a:pPr marL="342900" indent="-342900">
@@ -7198,11 +7197,7 @@
             </a:pPr>
             <a:r>
               <a:rPr lang="en-US" dirty="0" smtClean="0"/>
-              <a:t>SMT Navigation </a:t>
-            </a:r>
-            <a:r>
-              <a:rPr lang="en-US" dirty="0" smtClean="0"/>
-              <a:t>(MCH Line)</a:t>
+              <a:t>SMT Navigation (MCH Line)</a:t>
             </a:r>
           </a:p>
           <a:p>
@@ -7211,11 +7206,7 @@
             </a:pPr>
             <a:r>
               <a:rPr lang="en-US" dirty="0" smtClean="0"/>
-              <a:t>SMT </a:t>
-            </a:r>
-            <a:r>
-              <a:rPr lang="en-US" dirty="0" smtClean="0"/>
-              <a:t>Zero defect barcode</a:t>
+              <a:t>SMT Zero defect barcode</a:t>
             </a:r>
             <a:endParaRPr lang="en-US" dirty="0"/>
           </a:p>
@@ -7980,11 +7971,7 @@
             </a:r>
             <a:r>
               <a:rPr lang="en-US" dirty="0" smtClean="0"/>
-              <a:t> </a:t>
-            </a:r>
-            <a:r>
-              <a:rPr lang="en-US" dirty="0" smtClean="0"/>
-              <a:t>Traceability</a:t>
+              <a:t> Traceability</a:t>
             </a:r>
             <a:endParaRPr lang="en-US" dirty="0"/>
           </a:p>
@@ -19670,6 +19657,233 @@
           </a:p>
         </p:txBody>
       </p:sp>
+      <p:sp>
+        <p:nvSpPr>
+          <p:cNvPr id="116" name="TextBox 5"/>
+          <p:cNvSpPr txBox="1">
+            <a:spLocks noChangeArrowheads="1"/>
+          </p:cNvSpPr>
+          <p:nvPr/>
+        </p:nvSpPr>
+        <p:spPr bwMode="auto">
+          <a:xfrm>
+            <a:off x="390465" y="657225"/>
+            <a:ext cx="7550465" cy="430887"/>
+          </a:xfrm>
+          <a:prstGeom prst="rect">
+            <a:avLst/>
+          </a:prstGeom>
+          <a:noFill/>
+          <a:ln>
+            <a:noFill/>
+          </a:ln>
+          <a:extLst>
+            <a:ext uri="{909E8E84-426E-40DD-AFC4-6F175D3DCCD1}">
+              <a14:hiddenFill xmlns:a14="http://schemas.microsoft.com/office/drawing/2010/main">
+                <a:solidFill>
+                  <a:srgbClr val="FFFFFF"/>
+                </a:solidFill>
+              </a14:hiddenFill>
+            </a:ext>
+            <a:ext uri="{91240B29-F687-4F45-9708-019B960494DF}">
+              <a14:hiddenLine xmlns:a14="http://schemas.microsoft.com/office/drawing/2010/main" w="9525">
+                <a:solidFill>
+                  <a:srgbClr val="000000"/>
+                </a:solidFill>
+                <a:miter lim="800000"/>
+                <a:headEnd/>
+                <a:tailEnd/>
+              </a14:hiddenLine>
+            </a:ext>
+          </a:extLst>
+        </p:spPr>
+        <p:txBody>
+          <a:bodyPr wrap="none">
+            <a:spAutoFit/>
+          </a:bodyPr>
+          <a:lstStyle>
+            <a:lvl1pPr>
+              <a:spcBef>
+                <a:spcPct val="20000"/>
+              </a:spcBef>
+              <a:buChar char="•"/>
+              <a:defRPr kumimoji="1" sz="2000">
+                <a:solidFill>
+                  <a:schemeClr val="tx1"/>
+                </a:solidFill>
+                <a:latin typeface="Arial" panose="020B0604020202020204" pitchFamily="34" charset="0"/>
+                <a:ea typeface="ＭＳ Ｐゴシック" panose="020B0600070205080204" pitchFamily="34" charset="-128"/>
+              </a:defRPr>
+            </a:lvl1pPr>
+            <a:lvl2pPr marL="742950" indent="-285750">
+              <a:spcBef>
+                <a:spcPct val="20000"/>
+              </a:spcBef>
+              <a:buChar char="–"/>
+              <a:defRPr kumimoji="1" sz="2800">
+                <a:solidFill>
+                  <a:schemeClr val="tx1"/>
+                </a:solidFill>
+                <a:latin typeface="Arial" panose="020B0604020202020204" pitchFamily="34" charset="0"/>
+                <a:ea typeface="ＭＳ Ｐゴシック" panose="020B0600070205080204" pitchFamily="34" charset="-128"/>
+              </a:defRPr>
+            </a:lvl2pPr>
+            <a:lvl3pPr marL="1143000" indent="-228600">
+              <a:spcBef>
+                <a:spcPct val="20000"/>
+              </a:spcBef>
+              <a:buChar char="•"/>
+              <a:defRPr kumimoji="1" sz="1600">
+                <a:solidFill>
+                  <a:schemeClr val="tx1"/>
+                </a:solidFill>
+                <a:latin typeface="Arial" panose="020B0604020202020204" pitchFamily="34" charset="0"/>
+                <a:ea typeface="ＭＳ Ｐゴシック" panose="020B0600070205080204" pitchFamily="34" charset="-128"/>
+              </a:defRPr>
+            </a:lvl3pPr>
+            <a:lvl4pPr marL="1600200" indent="-228600">
+              <a:spcBef>
+                <a:spcPct val="20000"/>
+              </a:spcBef>
+              <a:buChar char="–"/>
+              <a:defRPr kumimoji="1" sz="1400">
+                <a:solidFill>
+                  <a:schemeClr val="tx1"/>
+                </a:solidFill>
+                <a:latin typeface="Arial" panose="020B0604020202020204" pitchFamily="34" charset="0"/>
+                <a:ea typeface="ＭＳ Ｐゴシック" panose="020B0600070205080204" pitchFamily="34" charset="-128"/>
+              </a:defRPr>
+            </a:lvl4pPr>
+            <a:lvl5pPr marL="2057400" indent="-228600">
+              <a:spcBef>
+                <a:spcPct val="20000"/>
+              </a:spcBef>
+              <a:buChar char="»"/>
+              <a:defRPr kumimoji="1" sz="1200">
+                <a:solidFill>
+                  <a:schemeClr val="tx1"/>
+                </a:solidFill>
+                <a:latin typeface="Arial" panose="020B0604020202020204" pitchFamily="34" charset="0"/>
+                <a:ea typeface="ＭＳ Ｐゴシック" panose="020B0600070205080204" pitchFamily="34" charset="-128"/>
+              </a:defRPr>
+            </a:lvl5pPr>
+            <a:lvl6pPr marL="2514600" indent="-228600" eaLnBrk="0" fontAlgn="base" hangingPunct="0">
+              <a:spcBef>
+                <a:spcPct val="20000"/>
+              </a:spcBef>
+              <a:spcAft>
+                <a:spcPct val="0"/>
+              </a:spcAft>
+              <a:buChar char="»"/>
+              <a:defRPr kumimoji="1" sz="1200">
+                <a:solidFill>
+                  <a:schemeClr val="tx1"/>
+                </a:solidFill>
+                <a:latin typeface="Arial" panose="020B0604020202020204" pitchFamily="34" charset="0"/>
+                <a:ea typeface="ＭＳ Ｐゴシック" panose="020B0600070205080204" pitchFamily="34" charset="-128"/>
+              </a:defRPr>
+            </a:lvl6pPr>
+            <a:lvl7pPr marL="2971800" indent="-228600" eaLnBrk="0" fontAlgn="base" hangingPunct="0">
+              <a:spcBef>
+                <a:spcPct val="20000"/>
+              </a:spcBef>
+              <a:spcAft>
+                <a:spcPct val="0"/>
+              </a:spcAft>
+              <a:buChar char="»"/>
+              <a:defRPr kumimoji="1" sz="1200">
+                <a:solidFill>
+                  <a:schemeClr val="tx1"/>
+                </a:solidFill>
+                <a:latin typeface="Arial" panose="020B0604020202020204" pitchFamily="34" charset="0"/>
+                <a:ea typeface="ＭＳ Ｐゴシック" panose="020B0600070205080204" pitchFamily="34" charset="-128"/>
+              </a:defRPr>
+            </a:lvl7pPr>
+            <a:lvl8pPr marL="3429000" indent="-228600" eaLnBrk="0" fontAlgn="base" hangingPunct="0">
+              <a:spcBef>
+                <a:spcPct val="20000"/>
+              </a:spcBef>
+              <a:spcAft>
+                <a:spcPct val="0"/>
+              </a:spcAft>
+              <a:buChar char="»"/>
+              <a:defRPr kumimoji="1" sz="1200">
+                <a:solidFill>
+                  <a:schemeClr val="tx1"/>
+                </a:solidFill>
+                <a:latin typeface="Arial" panose="020B0604020202020204" pitchFamily="34" charset="0"/>
+                <a:ea typeface="ＭＳ Ｐゴシック" panose="020B0600070205080204" pitchFamily="34" charset="-128"/>
+              </a:defRPr>
+            </a:lvl8pPr>
+            <a:lvl9pPr marL="3886200" indent="-228600" eaLnBrk="0" fontAlgn="base" hangingPunct="0">
+              <a:spcBef>
+                <a:spcPct val="20000"/>
+              </a:spcBef>
+              <a:spcAft>
+                <a:spcPct val="0"/>
+              </a:spcAft>
+              <a:buChar char="»"/>
+              <a:defRPr kumimoji="1" sz="1200">
+                <a:solidFill>
+                  <a:schemeClr val="tx1"/>
+                </a:solidFill>
+                <a:latin typeface="Arial" panose="020B0604020202020204" pitchFamily="34" charset="0"/>
+                <a:ea typeface="ＭＳ Ｐゴシック" panose="020B0600070205080204" pitchFamily="34" charset="-128"/>
+              </a:defRPr>
+            </a:lvl9pPr>
+          </a:lstStyle>
+          <a:p>
+            <a:pPr>
+              <a:spcBef>
+                <a:spcPct val="0"/>
+              </a:spcBef>
+              <a:buFontTx/>
+              <a:buNone/>
+            </a:pPr>
+            <a:r>
+              <a:rPr kumimoji="0" lang="en-US" altLang="en-US" sz="2200" b="1" dirty="0" smtClean="0"/>
+              <a:t>Mapping / </a:t>
+            </a:r>
+            <a:r>
+              <a:rPr kumimoji="0" lang="en-US" altLang="en-US" sz="2200" b="1" dirty="0" err="1" smtClean="0"/>
+              <a:t>Pemetaan</a:t>
+            </a:r>
+            <a:r>
+              <a:rPr kumimoji="0" lang="en-US" altLang="en-US" sz="2200" b="1" dirty="0" smtClean="0"/>
+              <a:t> </a:t>
+            </a:r>
+            <a:r>
+              <a:rPr kumimoji="0" lang="en-US" altLang="en-US" sz="2200" b="1" dirty="0" err="1" smtClean="0"/>
+              <a:t>sistem</a:t>
+            </a:r>
+            <a:r>
+              <a:rPr kumimoji="0" lang="en-US" altLang="en-US" sz="2200" b="1" dirty="0" smtClean="0"/>
+              <a:t> </a:t>
+            </a:r>
+            <a:r>
+              <a:rPr kumimoji="0" lang="en-US" altLang="en-US" sz="2200" b="1" dirty="0" err="1" smtClean="0"/>
+              <a:t>informasi</a:t>
+            </a:r>
+            <a:r>
+              <a:rPr kumimoji="0" lang="en-US" altLang="en-US" sz="2200" b="1" dirty="0" smtClean="0"/>
+              <a:t> </a:t>
+            </a:r>
+            <a:r>
+              <a:rPr kumimoji="0" lang="en-US" altLang="en-US" sz="2200" b="1" dirty="0" err="1" smtClean="0"/>
+              <a:t>pada</a:t>
+            </a:r>
+            <a:r>
+              <a:rPr kumimoji="0" lang="en-US" altLang="en-US" sz="2200" b="1" dirty="0" smtClean="0"/>
+              <a:t> sub-</a:t>
+            </a:r>
+            <a:r>
+              <a:rPr kumimoji="0" lang="en-US" altLang="en-US" sz="2200" b="1" dirty="0" err="1" smtClean="0"/>
+              <a:t>sistem</a:t>
+            </a:r>
+            <a:endParaRPr kumimoji="0" lang="en-US" altLang="en-US" sz="2200" b="1" dirty="0"/>
+          </a:p>
+        </p:txBody>
+      </p:sp>
       <p:grpSp>
         <p:nvGrpSpPr>
           <p:cNvPr id="4" name="Group 116"/>
@@ -19682,8 +19896,8 @@
           <a:xfrm>
             <a:off x="1020961" y="1349956"/>
             <a:ext cx="8085138" cy="4421188"/>
-            <a:chOff x="1299992" y="1357302"/>
-            <a:chExt cx="9388475" cy="5040312"/>
+            <a:chOff x="1299992" y="1357301"/>
+            <a:chExt cx="9388473" cy="5040308"/>
           </a:xfrm>
         </p:grpSpPr>
         <p:grpSp>
@@ -19696,8 +19910,8 @@
           </p:nvGrpSpPr>
           <p:grpSpPr bwMode="auto">
             <a:xfrm>
-              <a:off x="1299992" y="1357302"/>
-              <a:ext cx="9388475" cy="5040312"/>
+              <a:off x="1299992" y="1357301"/>
+              <a:ext cx="9388473" cy="5040308"/>
               <a:chOff x="744313" y="1505985"/>
               <a:chExt cx="9388475" cy="5040312"/>
             </a:xfrm>
@@ -23562,921 +23776,6 @@
               </a:extLst>
             </p:spPr>
           </p:pic>
-          <p:sp>
-            <p:nvSpPr>
-              <p:cNvPr id="34" name="Rectangle 97"/>
-              <p:cNvSpPr>
-                <a:spLocks noChangeArrowheads="1"/>
-              </p:cNvSpPr>
-              <p:nvPr/>
-            </p:nvSpPr>
-            <p:spPr bwMode="auto">
-              <a:xfrm>
-                <a:off x="3354163" y="5746197"/>
-                <a:ext cx="2217738" cy="300038"/>
-              </a:xfrm>
-              <a:prstGeom prst="rect">
-                <a:avLst/>
-              </a:prstGeom>
-              <a:solidFill>
-                <a:srgbClr val="4979C0"/>
-              </a:solidFill>
-              <a:ln>
-                <a:noFill/>
-              </a:ln>
-              <a:extLst>
-                <a:ext uri="{91240B29-F687-4F45-9708-019B960494DF}">
-                  <a14:hiddenLine xmlns:a14="http://schemas.microsoft.com/office/drawing/2010/main" w="9525">
-                    <a:solidFill>
-                      <a:srgbClr val="000000"/>
-                    </a:solidFill>
-                    <a:miter lim="800000"/>
-                    <a:headEnd/>
-                    <a:tailEnd/>
-                  </a14:hiddenLine>
-                </a:ext>
-              </a:extLst>
-            </p:spPr>
-            <p:txBody>
-              <a:bodyPr/>
-              <a:lstStyle>
-                <a:lvl1pPr>
-                  <a:spcBef>
-                    <a:spcPct val="20000"/>
-                  </a:spcBef>
-                  <a:buChar char="•"/>
-                  <a:defRPr kumimoji="1" sz="2000">
-                    <a:solidFill>
-                      <a:schemeClr val="tx1"/>
-                    </a:solidFill>
-                    <a:latin typeface="Arial" panose="020B0604020202020204" pitchFamily="34" charset="0"/>
-                    <a:ea typeface="ＭＳ Ｐゴシック" panose="020B0600070205080204" pitchFamily="34" charset="-128"/>
-                  </a:defRPr>
-                </a:lvl1pPr>
-                <a:lvl2pPr marL="742950" indent="-285750">
-                  <a:spcBef>
-                    <a:spcPct val="20000"/>
-                  </a:spcBef>
-                  <a:buChar char="–"/>
-                  <a:defRPr kumimoji="1" sz="2800">
-                    <a:solidFill>
-                      <a:schemeClr val="tx1"/>
-                    </a:solidFill>
-                    <a:latin typeface="Arial" panose="020B0604020202020204" pitchFamily="34" charset="0"/>
-                    <a:ea typeface="ＭＳ Ｐゴシック" panose="020B0600070205080204" pitchFamily="34" charset="-128"/>
-                  </a:defRPr>
-                </a:lvl2pPr>
-                <a:lvl3pPr marL="1143000" indent="-228600">
-                  <a:spcBef>
-                    <a:spcPct val="20000"/>
-                  </a:spcBef>
-                  <a:buChar char="•"/>
-                  <a:defRPr kumimoji="1" sz="1600">
-                    <a:solidFill>
-                      <a:schemeClr val="tx1"/>
-                    </a:solidFill>
-                    <a:latin typeface="Arial" panose="020B0604020202020204" pitchFamily="34" charset="0"/>
-                    <a:ea typeface="ＭＳ Ｐゴシック" panose="020B0600070205080204" pitchFamily="34" charset="-128"/>
-                  </a:defRPr>
-                </a:lvl3pPr>
-                <a:lvl4pPr marL="1600200" indent="-228600">
-                  <a:spcBef>
-                    <a:spcPct val="20000"/>
-                  </a:spcBef>
-                  <a:buChar char="–"/>
-                  <a:defRPr kumimoji="1" sz="1400">
-                    <a:solidFill>
-                      <a:schemeClr val="tx1"/>
-                    </a:solidFill>
-                    <a:latin typeface="Arial" panose="020B0604020202020204" pitchFamily="34" charset="0"/>
-                    <a:ea typeface="ＭＳ Ｐゴシック" panose="020B0600070205080204" pitchFamily="34" charset="-128"/>
-                  </a:defRPr>
-                </a:lvl4pPr>
-                <a:lvl5pPr marL="2057400" indent="-228600">
-                  <a:spcBef>
-                    <a:spcPct val="20000"/>
-                  </a:spcBef>
-                  <a:buChar char="»"/>
-                  <a:defRPr kumimoji="1" sz="1200">
-                    <a:solidFill>
-                      <a:schemeClr val="tx1"/>
-                    </a:solidFill>
-                    <a:latin typeface="Arial" panose="020B0604020202020204" pitchFamily="34" charset="0"/>
-                    <a:ea typeface="ＭＳ Ｐゴシック" panose="020B0600070205080204" pitchFamily="34" charset="-128"/>
-                  </a:defRPr>
-                </a:lvl5pPr>
-                <a:lvl6pPr marL="2514600" indent="-228600" eaLnBrk="0" fontAlgn="base" hangingPunct="0">
-                  <a:spcBef>
-                    <a:spcPct val="20000"/>
-                  </a:spcBef>
-                  <a:spcAft>
-                    <a:spcPct val="0"/>
-                  </a:spcAft>
-                  <a:buChar char="»"/>
-                  <a:defRPr kumimoji="1" sz="1200">
-                    <a:solidFill>
-                      <a:schemeClr val="tx1"/>
-                    </a:solidFill>
-                    <a:latin typeface="Arial" panose="020B0604020202020204" pitchFamily="34" charset="0"/>
-                    <a:ea typeface="ＭＳ Ｐゴシック" panose="020B0600070205080204" pitchFamily="34" charset="-128"/>
-                  </a:defRPr>
-                </a:lvl6pPr>
-                <a:lvl7pPr marL="2971800" indent="-228600" eaLnBrk="0" fontAlgn="base" hangingPunct="0">
-                  <a:spcBef>
-                    <a:spcPct val="20000"/>
-                  </a:spcBef>
-                  <a:spcAft>
-                    <a:spcPct val="0"/>
-                  </a:spcAft>
-                  <a:buChar char="»"/>
-                  <a:defRPr kumimoji="1" sz="1200">
-                    <a:solidFill>
-                      <a:schemeClr val="tx1"/>
-                    </a:solidFill>
-                    <a:latin typeface="Arial" panose="020B0604020202020204" pitchFamily="34" charset="0"/>
-                    <a:ea typeface="ＭＳ Ｐゴシック" panose="020B0600070205080204" pitchFamily="34" charset="-128"/>
-                  </a:defRPr>
-                </a:lvl7pPr>
-                <a:lvl8pPr marL="3429000" indent="-228600" eaLnBrk="0" fontAlgn="base" hangingPunct="0">
-                  <a:spcBef>
-                    <a:spcPct val="20000"/>
-                  </a:spcBef>
-                  <a:spcAft>
-                    <a:spcPct val="0"/>
-                  </a:spcAft>
-                  <a:buChar char="»"/>
-                  <a:defRPr kumimoji="1" sz="1200">
-                    <a:solidFill>
-                      <a:schemeClr val="tx1"/>
-                    </a:solidFill>
-                    <a:latin typeface="Arial" panose="020B0604020202020204" pitchFamily="34" charset="0"/>
-                    <a:ea typeface="ＭＳ Ｐゴシック" panose="020B0600070205080204" pitchFamily="34" charset="-128"/>
-                  </a:defRPr>
-                </a:lvl8pPr>
-                <a:lvl9pPr marL="3886200" indent="-228600" eaLnBrk="0" fontAlgn="base" hangingPunct="0">
-                  <a:spcBef>
-                    <a:spcPct val="20000"/>
-                  </a:spcBef>
-                  <a:spcAft>
-                    <a:spcPct val="0"/>
-                  </a:spcAft>
-                  <a:buChar char="»"/>
-                  <a:defRPr kumimoji="1" sz="1200">
-                    <a:solidFill>
-                      <a:schemeClr val="tx1"/>
-                    </a:solidFill>
-                    <a:latin typeface="Arial" panose="020B0604020202020204" pitchFamily="34" charset="0"/>
-                    <a:ea typeface="ＭＳ Ｐゴシック" panose="020B0600070205080204" pitchFamily="34" charset="-128"/>
-                  </a:defRPr>
-                </a:lvl9pPr>
-              </a:lstStyle>
-              <a:p>
-                <a:pPr>
-                  <a:spcBef>
-                    <a:spcPct val="0"/>
-                  </a:spcBef>
-                  <a:buFontTx/>
-                  <a:buNone/>
-                </a:pPr>
-                <a:endParaRPr kumimoji="0" lang="en-US" altLang="en-US" sz="1200" b="1"/>
-              </a:p>
-            </p:txBody>
-          </p:sp>
-          <p:sp>
-            <p:nvSpPr>
-              <p:cNvPr id="35" name="Rectangle 98"/>
-              <p:cNvSpPr>
-                <a:spLocks noChangeArrowheads="1"/>
-              </p:cNvSpPr>
-              <p:nvPr/>
-            </p:nvSpPr>
-            <p:spPr bwMode="auto">
-              <a:xfrm>
-                <a:off x="3354163" y="5746197"/>
-                <a:ext cx="2217738" cy="300038"/>
-              </a:xfrm>
-              <a:prstGeom prst="rect">
-                <a:avLst/>
-              </a:prstGeom>
-              <a:noFill/>
-              <a:ln w="3175" cap="rnd">
-                <a:solidFill>
-                  <a:srgbClr val="4979C0"/>
-                </a:solidFill>
-                <a:round/>
-                <a:headEnd/>
-                <a:tailEnd/>
-              </a:ln>
-              <a:extLst>
-                <a:ext uri="{909E8E84-426E-40DD-AFC4-6F175D3DCCD1}">
-                  <a14:hiddenFill xmlns:a14="http://schemas.microsoft.com/office/drawing/2010/main">
-                    <a:solidFill>
-                      <a:srgbClr val="FFFFFF"/>
-                    </a:solidFill>
-                  </a14:hiddenFill>
-                </a:ext>
-              </a:extLst>
-            </p:spPr>
-            <p:txBody>
-              <a:bodyPr/>
-              <a:lstStyle>
-                <a:lvl1pPr>
-                  <a:spcBef>
-                    <a:spcPct val="20000"/>
-                  </a:spcBef>
-                  <a:buChar char="•"/>
-                  <a:defRPr kumimoji="1" sz="2000">
-                    <a:solidFill>
-                      <a:schemeClr val="tx1"/>
-                    </a:solidFill>
-                    <a:latin typeface="Arial" panose="020B0604020202020204" pitchFamily="34" charset="0"/>
-                    <a:ea typeface="ＭＳ Ｐゴシック" panose="020B0600070205080204" pitchFamily="34" charset="-128"/>
-                  </a:defRPr>
-                </a:lvl1pPr>
-                <a:lvl2pPr marL="742950" indent="-285750">
-                  <a:spcBef>
-                    <a:spcPct val="20000"/>
-                  </a:spcBef>
-                  <a:buChar char="–"/>
-                  <a:defRPr kumimoji="1" sz="2800">
-                    <a:solidFill>
-                      <a:schemeClr val="tx1"/>
-                    </a:solidFill>
-                    <a:latin typeface="Arial" panose="020B0604020202020204" pitchFamily="34" charset="0"/>
-                    <a:ea typeface="ＭＳ Ｐゴシック" panose="020B0600070205080204" pitchFamily="34" charset="-128"/>
-                  </a:defRPr>
-                </a:lvl2pPr>
-                <a:lvl3pPr marL="1143000" indent="-228600">
-                  <a:spcBef>
-                    <a:spcPct val="20000"/>
-                  </a:spcBef>
-                  <a:buChar char="•"/>
-                  <a:defRPr kumimoji="1" sz="1600">
-                    <a:solidFill>
-                      <a:schemeClr val="tx1"/>
-                    </a:solidFill>
-                    <a:latin typeface="Arial" panose="020B0604020202020204" pitchFamily="34" charset="0"/>
-                    <a:ea typeface="ＭＳ Ｐゴシック" panose="020B0600070205080204" pitchFamily="34" charset="-128"/>
-                  </a:defRPr>
-                </a:lvl3pPr>
-                <a:lvl4pPr marL="1600200" indent="-228600">
-                  <a:spcBef>
-                    <a:spcPct val="20000"/>
-                  </a:spcBef>
-                  <a:buChar char="–"/>
-                  <a:defRPr kumimoji="1" sz="1400">
-                    <a:solidFill>
-                      <a:schemeClr val="tx1"/>
-                    </a:solidFill>
-                    <a:latin typeface="Arial" panose="020B0604020202020204" pitchFamily="34" charset="0"/>
-                    <a:ea typeface="ＭＳ Ｐゴシック" panose="020B0600070205080204" pitchFamily="34" charset="-128"/>
-                  </a:defRPr>
-                </a:lvl4pPr>
-                <a:lvl5pPr marL="2057400" indent="-228600">
-                  <a:spcBef>
-                    <a:spcPct val="20000"/>
-                  </a:spcBef>
-                  <a:buChar char="»"/>
-                  <a:defRPr kumimoji="1" sz="1200">
-                    <a:solidFill>
-                      <a:schemeClr val="tx1"/>
-                    </a:solidFill>
-                    <a:latin typeface="Arial" panose="020B0604020202020204" pitchFamily="34" charset="0"/>
-                    <a:ea typeface="ＭＳ Ｐゴシック" panose="020B0600070205080204" pitchFamily="34" charset="-128"/>
-                  </a:defRPr>
-                </a:lvl5pPr>
-                <a:lvl6pPr marL="2514600" indent="-228600" eaLnBrk="0" fontAlgn="base" hangingPunct="0">
-                  <a:spcBef>
-                    <a:spcPct val="20000"/>
-                  </a:spcBef>
-                  <a:spcAft>
-                    <a:spcPct val="0"/>
-                  </a:spcAft>
-                  <a:buChar char="»"/>
-                  <a:defRPr kumimoji="1" sz="1200">
-                    <a:solidFill>
-                      <a:schemeClr val="tx1"/>
-                    </a:solidFill>
-                    <a:latin typeface="Arial" panose="020B0604020202020204" pitchFamily="34" charset="0"/>
-                    <a:ea typeface="ＭＳ Ｐゴシック" panose="020B0600070205080204" pitchFamily="34" charset="-128"/>
-                  </a:defRPr>
-                </a:lvl6pPr>
-                <a:lvl7pPr marL="2971800" indent="-228600" eaLnBrk="0" fontAlgn="base" hangingPunct="0">
-                  <a:spcBef>
-                    <a:spcPct val="20000"/>
-                  </a:spcBef>
-                  <a:spcAft>
-                    <a:spcPct val="0"/>
-                  </a:spcAft>
-                  <a:buChar char="»"/>
-                  <a:defRPr kumimoji="1" sz="1200">
-                    <a:solidFill>
-                      <a:schemeClr val="tx1"/>
-                    </a:solidFill>
-                    <a:latin typeface="Arial" panose="020B0604020202020204" pitchFamily="34" charset="0"/>
-                    <a:ea typeface="ＭＳ Ｐゴシック" panose="020B0600070205080204" pitchFamily="34" charset="-128"/>
-                  </a:defRPr>
-                </a:lvl7pPr>
-                <a:lvl8pPr marL="3429000" indent="-228600" eaLnBrk="0" fontAlgn="base" hangingPunct="0">
-                  <a:spcBef>
-                    <a:spcPct val="20000"/>
-                  </a:spcBef>
-                  <a:spcAft>
-                    <a:spcPct val="0"/>
-                  </a:spcAft>
-                  <a:buChar char="»"/>
-                  <a:defRPr kumimoji="1" sz="1200">
-                    <a:solidFill>
-                      <a:schemeClr val="tx1"/>
-                    </a:solidFill>
-                    <a:latin typeface="Arial" panose="020B0604020202020204" pitchFamily="34" charset="0"/>
-                    <a:ea typeface="ＭＳ Ｐゴシック" panose="020B0600070205080204" pitchFamily="34" charset="-128"/>
-                  </a:defRPr>
-                </a:lvl8pPr>
-                <a:lvl9pPr marL="3886200" indent="-228600" eaLnBrk="0" fontAlgn="base" hangingPunct="0">
-                  <a:spcBef>
-                    <a:spcPct val="20000"/>
-                  </a:spcBef>
-                  <a:spcAft>
-                    <a:spcPct val="0"/>
-                  </a:spcAft>
-                  <a:buChar char="»"/>
-                  <a:defRPr kumimoji="1" sz="1200">
-                    <a:solidFill>
-                      <a:schemeClr val="tx1"/>
-                    </a:solidFill>
-                    <a:latin typeface="Arial" panose="020B0604020202020204" pitchFamily="34" charset="0"/>
-                    <a:ea typeface="ＭＳ Ｐゴシック" panose="020B0600070205080204" pitchFamily="34" charset="-128"/>
-                  </a:defRPr>
-                </a:lvl9pPr>
-              </a:lstStyle>
-              <a:p>
-                <a:pPr>
-                  <a:spcBef>
-                    <a:spcPct val="0"/>
-                  </a:spcBef>
-                  <a:buFontTx/>
-                  <a:buNone/>
-                </a:pPr>
-                <a:endParaRPr kumimoji="0" lang="en-US" altLang="en-US" sz="1200" b="1"/>
-              </a:p>
-            </p:txBody>
-          </p:sp>
-          <p:sp>
-            <p:nvSpPr>
-              <p:cNvPr id="36" name="Rectangle 99"/>
-              <p:cNvSpPr>
-                <a:spLocks noChangeArrowheads="1"/>
-              </p:cNvSpPr>
-              <p:nvPr/>
-            </p:nvSpPr>
-            <p:spPr bwMode="auto">
-              <a:xfrm>
-                <a:off x="3250975" y="5662060"/>
-                <a:ext cx="2219325" cy="300038"/>
-              </a:xfrm>
-              <a:prstGeom prst="rect">
-                <a:avLst/>
-              </a:prstGeom>
-              <a:solidFill>
-                <a:srgbClr val="FFFFFF"/>
-              </a:solidFill>
-              <a:ln>
-                <a:noFill/>
-              </a:ln>
-              <a:extLst>
-                <a:ext uri="{91240B29-F687-4F45-9708-019B960494DF}">
-                  <a14:hiddenLine xmlns:a14="http://schemas.microsoft.com/office/drawing/2010/main" w="9525">
-                    <a:solidFill>
-                      <a:srgbClr val="000000"/>
-                    </a:solidFill>
-                    <a:miter lim="800000"/>
-                    <a:headEnd/>
-                    <a:tailEnd/>
-                  </a14:hiddenLine>
-                </a:ext>
-              </a:extLst>
-            </p:spPr>
-            <p:txBody>
-              <a:bodyPr/>
-              <a:lstStyle>
-                <a:lvl1pPr>
-                  <a:spcBef>
-                    <a:spcPct val="20000"/>
-                  </a:spcBef>
-                  <a:buChar char="•"/>
-                  <a:defRPr kumimoji="1" sz="2000">
-                    <a:solidFill>
-                      <a:schemeClr val="tx1"/>
-                    </a:solidFill>
-                    <a:latin typeface="Arial" panose="020B0604020202020204" pitchFamily="34" charset="0"/>
-                    <a:ea typeface="ＭＳ Ｐゴシック" panose="020B0600070205080204" pitchFamily="34" charset="-128"/>
-                  </a:defRPr>
-                </a:lvl1pPr>
-                <a:lvl2pPr marL="742950" indent="-285750">
-                  <a:spcBef>
-                    <a:spcPct val="20000"/>
-                  </a:spcBef>
-                  <a:buChar char="–"/>
-                  <a:defRPr kumimoji="1" sz="2800">
-                    <a:solidFill>
-                      <a:schemeClr val="tx1"/>
-                    </a:solidFill>
-                    <a:latin typeface="Arial" panose="020B0604020202020204" pitchFamily="34" charset="0"/>
-                    <a:ea typeface="ＭＳ Ｐゴシック" panose="020B0600070205080204" pitchFamily="34" charset="-128"/>
-                  </a:defRPr>
-                </a:lvl2pPr>
-                <a:lvl3pPr marL="1143000" indent="-228600">
-                  <a:spcBef>
-                    <a:spcPct val="20000"/>
-                  </a:spcBef>
-                  <a:buChar char="•"/>
-                  <a:defRPr kumimoji="1" sz="1600">
-                    <a:solidFill>
-                      <a:schemeClr val="tx1"/>
-                    </a:solidFill>
-                    <a:latin typeface="Arial" panose="020B0604020202020204" pitchFamily="34" charset="0"/>
-                    <a:ea typeface="ＭＳ Ｐゴシック" panose="020B0600070205080204" pitchFamily="34" charset="-128"/>
-                  </a:defRPr>
-                </a:lvl3pPr>
-                <a:lvl4pPr marL="1600200" indent="-228600">
-                  <a:spcBef>
-                    <a:spcPct val="20000"/>
-                  </a:spcBef>
-                  <a:buChar char="–"/>
-                  <a:defRPr kumimoji="1" sz="1400">
-                    <a:solidFill>
-                      <a:schemeClr val="tx1"/>
-                    </a:solidFill>
-                    <a:latin typeface="Arial" panose="020B0604020202020204" pitchFamily="34" charset="0"/>
-                    <a:ea typeface="ＭＳ Ｐゴシック" panose="020B0600070205080204" pitchFamily="34" charset="-128"/>
-                  </a:defRPr>
-                </a:lvl4pPr>
-                <a:lvl5pPr marL="2057400" indent="-228600">
-                  <a:spcBef>
-                    <a:spcPct val="20000"/>
-                  </a:spcBef>
-                  <a:buChar char="»"/>
-                  <a:defRPr kumimoji="1" sz="1200">
-                    <a:solidFill>
-                      <a:schemeClr val="tx1"/>
-                    </a:solidFill>
-                    <a:latin typeface="Arial" panose="020B0604020202020204" pitchFamily="34" charset="0"/>
-                    <a:ea typeface="ＭＳ Ｐゴシック" panose="020B0600070205080204" pitchFamily="34" charset="-128"/>
-                  </a:defRPr>
-                </a:lvl5pPr>
-                <a:lvl6pPr marL="2514600" indent="-228600" eaLnBrk="0" fontAlgn="base" hangingPunct="0">
-                  <a:spcBef>
-                    <a:spcPct val="20000"/>
-                  </a:spcBef>
-                  <a:spcAft>
-                    <a:spcPct val="0"/>
-                  </a:spcAft>
-                  <a:buChar char="»"/>
-                  <a:defRPr kumimoji="1" sz="1200">
-                    <a:solidFill>
-                      <a:schemeClr val="tx1"/>
-                    </a:solidFill>
-                    <a:latin typeface="Arial" panose="020B0604020202020204" pitchFamily="34" charset="0"/>
-                    <a:ea typeface="ＭＳ Ｐゴシック" panose="020B0600070205080204" pitchFamily="34" charset="-128"/>
-                  </a:defRPr>
-                </a:lvl6pPr>
-                <a:lvl7pPr marL="2971800" indent="-228600" eaLnBrk="0" fontAlgn="base" hangingPunct="0">
-                  <a:spcBef>
-                    <a:spcPct val="20000"/>
-                  </a:spcBef>
-                  <a:spcAft>
-                    <a:spcPct val="0"/>
-                  </a:spcAft>
-                  <a:buChar char="»"/>
-                  <a:defRPr kumimoji="1" sz="1200">
-                    <a:solidFill>
-                      <a:schemeClr val="tx1"/>
-                    </a:solidFill>
-                    <a:latin typeface="Arial" panose="020B0604020202020204" pitchFamily="34" charset="0"/>
-                    <a:ea typeface="ＭＳ Ｐゴシック" panose="020B0600070205080204" pitchFamily="34" charset="-128"/>
-                  </a:defRPr>
-                </a:lvl7pPr>
-                <a:lvl8pPr marL="3429000" indent="-228600" eaLnBrk="0" fontAlgn="base" hangingPunct="0">
-                  <a:spcBef>
-                    <a:spcPct val="20000"/>
-                  </a:spcBef>
-                  <a:spcAft>
-                    <a:spcPct val="0"/>
-                  </a:spcAft>
-                  <a:buChar char="»"/>
-                  <a:defRPr kumimoji="1" sz="1200">
-                    <a:solidFill>
-                      <a:schemeClr val="tx1"/>
-                    </a:solidFill>
-                    <a:latin typeface="Arial" panose="020B0604020202020204" pitchFamily="34" charset="0"/>
-                    <a:ea typeface="ＭＳ Ｐゴシック" panose="020B0600070205080204" pitchFamily="34" charset="-128"/>
-                  </a:defRPr>
-                </a:lvl8pPr>
-                <a:lvl9pPr marL="3886200" indent="-228600" eaLnBrk="0" fontAlgn="base" hangingPunct="0">
-                  <a:spcBef>
-                    <a:spcPct val="20000"/>
-                  </a:spcBef>
-                  <a:spcAft>
-                    <a:spcPct val="0"/>
-                  </a:spcAft>
-                  <a:buChar char="»"/>
-                  <a:defRPr kumimoji="1" sz="1200">
-                    <a:solidFill>
-                      <a:schemeClr val="tx1"/>
-                    </a:solidFill>
-                    <a:latin typeface="Arial" panose="020B0604020202020204" pitchFamily="34" charset="0"/>
-                    <a:ea typeface="ＭＳ Ｐゴシック" panose="020B0600070205080204" pitchFamily="34" charset="-128"/>
-                  </a:defRPr>
-                </a:lvl9pPr>
-              </a:lstStyle>
-              <a:p>
-                <a:pPr>
-                  <a:spcBef>
-                    <a:spcPct val="0"/>
-                  </a:spcBef>
-                  <a:buFontTx/>
-                  <a:buNone/>
-                </a:pPr>
-                <a:endParaRPr kumimoji="0" lang="en-US" altLang="en-US" sz="1200" b="1"/>
-              </a:p>
-            </p:txBody>
-          </p:sp>
-          <p:sp>
-            <p:nvSpPr>
-              <p:cNvPr id="37" name="Rectangle 100"/>
-              <p:cNvSpPr>
-                <a:spLocks noChangeArrowheads="1"/>
-              </p:cNvSpPr>
-              <p:nvPr/>
-            </p:nvSpPr>
-            <p:spPr bwMode="auto">
-              <a:xfrm>
-                <a:off x="3250975" y="5662060"/>
-                <a:ext cx="2219325" cy="300038"/>
-              </a:xfrm>
-              <a:prstGeom prst="rect">
-                <a:avLst/>
-              </a:prstGeom>
-              <a:noFill/>
-              <a:ln w="3175" cap="rnd">
-                <a:solidFill>
-                  <a:srgbClr val="000000"/>
-                </a:solidFill>
-                <a:round/>
-                <a:headEnd/>
-                <a:tailEnd/>
-              </a:ln>
-              <a:extLst>
-                <a:ext uri="{909E8E84-426E-40DD-AFC4-6F175D3DCCD1}">
-                  <a14:hiddenFill xmlns:a14="http://schemas.microsoft.com/office/drawing/2010/main">
-                    <a:solidFill>
-                      <a:srgbClr val="FFFFFF"/>
-                    </a:solidFill>
-                  </a14:hiddenFill>
-                </a:ext>
-              </a:extLst>
-            </p:spPr>
-            <p:txBody>
-              <a:bodyPr/>
-              <a:lstStyle>
-                <a:lvl1pPr>
-                  <a:spcBef>
-                    <a:spcPct val="20000"/>
-                  </a:spcBef>
-                  <a:buChar char="•"/>
-                  <a:defRPr kumimoji="1" sz="2000">
-                    <a:solidFill>
-                      <a:schemeClr val="tx1"/>
-                    </a:solidFill>
-                    <a:latin typeface="Arial" panose="020B0604020202020204" pitchFamily="34" charset="0"/>
-                    <a:ea typeface="ＭＳ Ｐゴシック" panose="020B0600070205080204" pitchFamily="34" charset="-128"/>
-                  </a:defRPr>
-                </a:lvl1pPr>
-                <a:lvl2pPr marL="742950" indent="-285750">
-                  <a:spcBef>
-                    <a:spcPct val="20000"/>
-                  </a:spcBef>
-                  <a:buChar char="–"/>
-                  <a:defRPr kumimoji="1" sz="2800">
-                    <a:solidFill>
-                      <a:schemeClr val="tx1"/>
-                    </a:solidFill>
-                    <a:latin typeface="Arial" panose="020B0604020202020204" pitchFamily="34" charset="0"/>
-                    <a:ea typeface="ＭＳ Ｐゴシック" panose="020B0600070205080204" pitchFamily="34" charset="-128"/>
-                  </a:defRPr>
-                </a:lvl2pPr>
-                <a:lvl3pPr marL="1143000" indent="-228600">
-                  <a:spcBef>
-                    <a:spcPct val="20000"/>
-                  </a:spcBef>
-                  <a:buChar char="•"/>
-                  <a:defRPr kumimoji="1" sz="1600">
-                    <a:solidFill>
-                      <a:schemeClr val="tx1"/>
-                    </a:solidFill>
-                    <a:latin typeface="Arial" panose="020B0604020202020204" pitchFamily="34" charset="0"/>
-                    <a:ea typeface="ＭＳ Ｐゴシック" panose="020B0600070205080204" pitchFamily="34" charset="-128"/>
-                  </a:defRPr>
-                </a:lvl3pPr>
-                <a:lvl4pPr marL="1600200" indent="-228600">
-                  <a:spcBef>
-                    <a:spcPct val="20000"/>
-                  </a:spcBef>
-                  <a:buChar char="–"/>
-                  <a:defRPr kumimoji="1" sz="1400">
-                    <a:solidFill>
-                      <a:schemeClr val="tx1"/>
-                    </a:solidFill>
-                    <a:latin typeface="Arial" panose="020B0604020202020204" pitchFamily="34" charset="0"/>
-                    <a:ea typeface="ＭＳ Ｐゴシック" panose="020B0600070205080204" pitchFamily="34" charset="-128"/>
-                  </a:defRPr>
-                </a:lvl4pPr>
-                <a:lvl5pPr marL="2057400" indent="-228600">
-                  <a:spcBef>
-                    <a:spcPct val="20000"/>
-                  </a:spcBef>
-                  <a:buChar char="»"/>
-                  <a:defRPr kumimoji="1" sz="1200">
-                    <a:solidFill>
-                      <a:schemeClr val="tx1"/>
-                    </a:solidFill>
-                    <a:latin typeface="Arial" panose="020B0604020202020204" pitchFamily="34" charset="0"/>
-                    <a:ea typeface="ＭＳ Ｐゴシック" panose="020B0600070205080204" pitchFamily="34" charset="-128"/>
-                  </a:defRPr>
-                </a:lvl5pPr>
-                <a:lvl6pPr marL="2514600" indent="-228600" eaLnBrk="0" fontAlgn="base" hangingPunct="0">
-                  <a:spcBef>
-                    <a:spcPct val="20000"/>
-                  </a:spcBef>
-                  <a:spcAft>
-                    <a:spcPct val="0"/>
-                  </a:spcAft>
-                  <a:buChar char="»"/>
-                  <a:defRPr kumimoji="1" sz="1200">
-                    <a:solidFill>
-                      <a:schemeClr val="tx1"/>
-                    </a:solidFill>
-                    <a:latin typeface="Arial" panose="020B0604020202020204" pitchFamily="34" charset="0"/>
-                    <a:ea typeface="ＭＳ Ｐゴシック" panose="020B0600070205080204" pitchFamily="34" charset="-128"/>
-                  </a:defRPr>
-                </a:lvl6pPr>
-                <a:lvl7pPr marL="2971800" indent="-228600" eaLnBrk="0" fontAlgn="base" hangingPunct="0">
-                  <a:spcBef>
-                    <a:spcPct val="20000"/>
-                  </a:spcBef>
-                  <a:spcAft>
-                    <a:spcPct val="0"/>
-                  </a:spcAft>
-                  <a:buChar char="»"/>
-                  <a:defRPr kumimoji="1" sz="1200">
-                    <a:solidFill>
-                      <a:schemeClr val="tx1"/>
-                    </a:solidFill>
-                    <a:latin typeface="Arial" panose="020B0604020202020204" pitchFamily="34" charset="0"/>
-                    <a:ea typeface="ＭＳ Ｐゴシック" panose="020B0600070205080204" pitchFamily="34" charset="-128"/>
-                  </a:defRPr>
-                </a:lvl7pPr>
-                <a:lvl8pPr marL="3429000" indent="-228600" eaLnBrk="0" fontAlgn="base" hangingPunct="0">
-                  <a:spcBef>
-                    <a:spcPct val="20000"/>
-                  </a:spcBef>
-                  <a:spcAft>
-                    <a:spcPct val="0"/>
-                  </a:spcAft>
-                  <a:buChar char="»"/>
-                  <a:defRPr kumimoji="1" sz="1200">
-                    <a:solidFill>
-                      <a:schemeClr val="tx1"/>
-                    </a:solidFill>
-                    <a:latin typeface="Arial" panose="020B0604020202020204" pitchFamily="34" charset="0"/>
-                    <a:ea typeface="ＭＳ Ｐゴシック" panose="020B0600070205080204" pitchFamily="34" charset="-128"/>
-                  </a:defRPr>
-                </a:lvl8pPr>
-                <a:lvl9pPr marL="3886200" indent="-228600" eaLnBrk="0" fontAlgn="base" hangingPunct="0">
-                  <a:spcBef>
-                    <a:spcPct val="20000"/>
-                  </a:spcBef>
-                  <a:spcAft>
-                    <a:spcPct val="0"/>
-                  </a:spcAft>
-                  <a:buChar char="»"/>
-                  <a:defRPr kumimoji="1" sz="1200">
-                    <a:solidFill>
-                      <a:schemeClr val="tx1"/>
-                    </a:solidFill>
-                    <a:latin typeface="Arial" panose="020B0604020202020204" pitchFamily="34" charset="0"/>
-                    <a:ea typeface="ＭＳ Ｐゴシック" panose="020B0600070205080204" pitchFamily="34" charset="-128"/>
-                  </a:defRPr>
-                </a:lvl9pPr>
-              </a:lstStyle>
-              <a:p>
-                <a:pPr>
-                  <a:spcBef>
-                    <a:spcPct val="0"/>
-                  </a:spcBef>
-                  <a:buFontTx/>
-                  <a:buNone/>
-                </a:pPr>
-                <a:endParaRPr kumimoji="0" lang="en-US" altLang="en-US" sz="1200" b="1"/>
-              </a:p>
-            </p:txBody>
-          </p:sp>
-          <p:sp>
-            <p:nvSpPr>
-              <p:cNvPr id="38" name="Rectangle 101"/>
-              <p:cNvSpPr>
-                <a:spLocks noChangeArrowheads="1"/>
-              </p:cNvSpPr>
-              <p:nvPr/>
-            </p:nvSpPr>
-            <p:spPr bwMode="auto">
-              <a:xfrm>
-                <a:off x="4154263" y="5695397"/>
-                <a:ext cx="318295" cy="210525"/>
-              </a:xfrm>
-              <a:prstGeom prst="rect">
-                <a:avLst/>
-              </a:prstGeom>
-              <a:noFill/>
-              <a:ln>
-                <a:noFill/>
-              </a:ln>
-              <a:extLst>
-                <a:ext uri="{909E8E84-426E-40DD-AFC4-6F175D3DCCD1}">
-                  <a14:hiddenFill xmlns:a14="http://schemas.microsoft.com/office/drawing/2010/main">
-                    <a:solidFill>
-                      <a:srgbClr val="FFFFFF"/>
-                    </a:solidFill>
-                  </a14:hiddenFill>
-                </a:ext>
-                <a:ext uri="{91240B29-F687-4F45-9708-019B960494DF}">
-                  <a14:hiddenLine xmlns:a14="http://schemas.microsoft.com/office/drawing/2010/main" w="9525">
-                    <a:solidFill>
-                      <a:srgbClr val="000000"/>
-                    </a:solidFill>
-                    <a:miter lim="800000"/>
-                    <a:headEnd/>
-                    <a:tailEnd/>
-                  </a14:hiddenLine>
-                </a:ext>
-              </a:extLst>
-            </p:spPr>
-            <p:txBody>
-              <a:bodyPr wrap="none" lIns="0" tIns="0" rIns="0" bIns="0">
-                <a:spAutoFit/>
-              </a:bodyPr>
-              <a:lstStyle>
-                <a:lvl1pPr>
-                  <a:spcBef>
-                    <a:spcPct val="20000"/>
-                  </a:spcBef>
-                  <a:buChar char="•"/>
-                  <a:defRPr kumimoji="1" sz="2000">
-                    <a:solidFill>
-                      <a:schemeClr val="tx1"/>
-                    </a:solidFill>
-                    <a:latin typeface="Arial" panose="020B0604020202020204" pitchFamily="34" charset="0"/>
-                    <a:ea typeface="ＭＳ Ｐゴシック" panose="020B0600070205080204" pitchFamily="34" charset="-128"/>
-                  </a:defRPr>
-                </a:lvl1pPr>
-                <a:lvl2pPr marL="742950" indent="-285750">
-                  <a:spcBef>
-                    <a:spcPct val="20000"/>
-                  </a:spcBef>
-                  <a:buChar char="–"/>
-                  <a:defRPr kumimoji="1" sz="2800">
-                    <a:solidFill>
-                      <a:schemeClr val="tx1"/>
-                    </a:solidFill>
-                    <a:latin typeface="Arial" panose="020B0604020202020204" pitchFamily="34" charset="0"/>
-                    <a:ea typeface="ＭＳ Ｐゴシック" panose="020B0600070205080204" pitchFamily="34" charset="-128"/>
-                  </a:defRPr>
-                </a:lvl2pPr>
-                <a:lvl3pPr marL="1143000" indent="-228600">
-                  <a:spcBef>
-                    <a:spcPct val="20000"/>
-                  </a:spcBef>
-                  <a:buChar char="•"/>
-                  <a:defRPr kumimoji="1" sz="1600">
-                    <a:solidFill>
-                      <a:schemeClr val="tx1"/>
-                    </a:solidFill>
-                    <a:latin typeface="Arial" panose="020B0604020202020204" pitchFamily="34" charset="0"/>
-                    <a:ea typeface="ＭＳ Ｐゴシック" panose="020B0600070205080204" pitchFamily="34" charset="-128"/>
-                  </a:defRPr>
-                </a:lvl3pPr>
-                <a:lvl4pPr marL="1600200" indent="-228600">
-                  <a:spcBef>
-                    <a:spcPct val="20000"/>
-                  </a:spcBef>
-                  <a:buChar char="–"/>
-                  <a:defRPr kumimoji="1" sz="1400">
-                    <a:solidFill>
-                      <a:schemeClr val="tx1"/>
-                    </a:solidFill>
-                    <a:latin typeface="Arial" panose="020B0604020202020204" pitchFamily="34" charset="0"/>
-                    <a:ea typeface="ＭＳ Ｐゴシック" panose="020B0600070205080204" pitchFamily="34" charset="-128"/>
-                  </a:defRPr>
-                </a:lvl4pPr>
-                <a:lvl5pPr marL="2057400" indent="-228600">
-                  <a:spcBef>
-                    <a:spcPct val="20000"/>
-                  </a:spcBef>
-                  <a:buChar char="»"/>
-                  <a:defRPr kumimoji="1" sz="1200">
-                    <a:solidFill>
-                      <a:schemeClr val="tx1"/>
-                    </a:solidFill>
-                    <a:latin typeface="Arial" panose="020B0604020202020204" pitchFamily="34" charset="0"/>
-                    <a:ea typeface="ＭＳ Ｐゴシック" panose="020B0600070205080204" pitchFamily="34" charset="-128"/>
-                  </a:defRPr>
-                </a:lvl5pPr>
-                <a:lvl6pPr marL="2514600" indent="-228600" eaLnBrk="0" fontAlgn="base" hangingPunct="0">
-                  <a:spcBef>
-                    <a:spcPct val="20000"/>
-                  </a:spcBef>
-                  <a:spcAft>
-                    <a:spcPct val="0"/>
-                  </a:spcAft>
-                  <a:buChar char="»"/>
-                  <a:defRPr kumimoji="1" sz="1200">
-                    <a:solidFill>
-                      <a:schemeClr val="tx1"/>
-                    </a:solidFill>
-                    <a:latin typeface="Arial" panose="020B0604020202020204" pitchFamily="34" charset="0"/>
-                    <a:ea typeface="ＭＳ Ｐゴシック" panose="020B0600070205080204" pitchFamily="34" charset="-128"/>
-                  </a:defRPr>
-                </a:lvl6pPr>
-                <a:lvl7pPr marL="2971800" indent="-228600" eaLnBrk="0" fontAlgn="base" hangingPunct="0">
-                  <a:spcBef>
-                    <a:spcPct val="20000"/>
-                  </a:spcBef>
-                  <a:spcAft>
-                    <a:spcPct val="0"/>
-                  </a:spcAft>
-                  <a:buChar char="»"/>
-                  <a:defRPr kumimoji="1" sz="1200">
-                    <a:solidFill>
-                      <a:schemeClr val="tx1"/>
-                    </a:solidFill>
-                    <a:latin typeface="Arial" panose="020B0604020202020204" pitchFamily="34" charset="0"/>
-                    <a:ea typeface="ＭＳ Ｐゴシック" panose="020B0600070205080204" pitchFamily="34" charset="-128"/>
-                  </a:defRPr>
-                </a:lvl7pPr>
-                <a:lvl8pPr marL="3429000" indent="-228600" eaLnBrk="0" fontAlgn="base" hangingPunct="0">
-                  <a:spcBef>
-                    <a:spcPct val="20000"/>
-                  </a:spcBef>
-                  <a:spcAft>
-                    <a:spcPct val="0"/>
-                  </a:spcAft>
-                  <a:buChar char="»"/>
-                  <a:defRPr kumimoji="1" sz="1200">
-                    <a:solidFill>
-                      <a:schemeClr val="tx1"/>
-                    </a:solidFill>
-                    <a:latin typeface="Arial" panose="020B0604020202020204" pitchFamily="34" charset="0"/>
-                    <a:ea typeface="ＭＳ Ｐゴシック" panose="020B0600070205080204" pitchFamily="34" charset="-128"/>
-                  </a:defRPr>
-                </a:lvl8pPr>
-                <a:lvl9pPr marL="3886200" indent="-228600" eaLnBrk="0" fontAlgn="base" hangingPunct="0">
-                  <a:spcBef>
-                    <a:spcPct val="20000"/>
-                  </a:spcBef>
-                  <a:spcAft>
-                    <a:spcPct val="0"/>
-                  </a:spcAft>
-                  <a:buChar char="»"/>
-                  <a:defRPr kumimoji="1" sz="1200">
-                    <a:solidFill>
-                      <a:schemeClr val="tx1"/>
-                    </a:solidFill>
-                    <a:latin typeface="Arial" panose="020B0604020202020204" pitchFamily="34" charset="0"/>
-                    <a:ea typeface="ＭＳ Ｐゴシック" panose="020B0600070205080204" pitchFamily="34" charset="-128"/>
-                  </a:defRPr>
-                </a:lvl9pPr>
-              </a:lstStyle>
-              <a:p>
-                <a:pPr>
-                  <a:spcBef>
-                    <a:spcPct val="0"/>
-                  </a:spcBef>
-                  <a:buFontTx/>
-                  <a:buNone/>
-                </a:pPr>
-                <a:r>
-                  <a:rPr kumimoji="0" lang="en-US" altLang="en-US" sz="1200" b="1">
-                    <a:solidFill>
-                      <a:srgbClr val="000000"/>
-                    </a:solidFill>
-                  </a:rPr>
-                  <a:t>IQC</a:t>
-                </a:r>
-                <a:endParaRPr kumimoji="0" lang="en-US" altLang="en-US" sz="1200" b="1"/>
-              </a:p>
-            </p:txBody>
-          </p:sp>
           <p:pic>
             <p:nvPicPr>
               <p:cNvPr id="39" name="Picture 102"/>
@@ -24531,60 +23830,6 @@
               </a:extLst>
             </p:spPr>
           </p:pic>
-          <p:pic>
-            <p:nvPicPr>
-              <p:cNvPr id="40" name="Picture 103"/>
-              <p:cNvPicPr>
-                <a:picLocks noChangeAspect="1" noChangeArrowheads="1"/>
-              </p:cNvPicPr>
-              <p:nvPr/>
-            </p:nvPicPr>
-            <p:blipFill>
-              <a:blip r:embed="rId11">
-                <a:extLst>
-                  <a:ext uri="{28A0092B-C50C-407E-A947-70E740481C1C}">
-                    <a14:useLocalDpi xmlns:a14="http://schemas.microsoft.com/office/drawing/2010/main" val="0"/>
-                  </a:ext>
-                </a:extLst>
-              </a:blip>
-              <a:srcRect/>
-              <a:stretch>
-                <a:fillRect/>
-              </a:stretch>
-            </p:blipFill>
-            <p:spPr bwMode="auto">
-              <a:xfrm>
-                <a:off x="3281138" y="5681110"/>
-                <a:ext cx="376238" cy="257175"/>
-              </a:xfrm>
-              <a:prstGeom prst="rect">
-                <a:avLst/>
-              </a:prstGeom>
-              <a:noFill/>
-              <a:ln>
-                <a:noFill/>
-              </a:ln>
-              <a:extLst>
-                <a:ext uri="{909E8E84-426E-40DD-AFC4-6F175D3DCCD1}">
-                  <a14:hiddenFill xmlns:a14="http://schemas.microsoft.com/office/drawing/2010/main">
-                    <a:solidFill>
-                      <a:srgbClr val="FFFFFF"/>
-                    </a:solidFill>
-                  </a14:hiddenFill>
-                </a:ext>
-                <a:ext uri="{91240B29-F687-4F45-9708-019B960494DF}">
-                  <a14:hiddenLine xmlns:a14="http://schemas.microsoft.com/office/drawing/2010/main" w="9525">
-                    <a:solidFill>
-                      <a:srgbClr val="000000"/>
-                    </a:solidFill>
-                    <a:miter lim="800000"/>
-                    <a:headEnd/>
-                    <a:tailEnd/>
-                  </a14:hiddenLine>
-                </a:ext>
-              </a:extLst>
-            </p:spPr>
-          </p:pic>
           <p:sp>
             <p:nvSpPr>
               <p:cNvPr id="41" name="Rectangle 104"/>
@@ -25509,7 +24754,7 @@
               <p:nvPr/>
             </p:nvPicPr>
             <p:blipFill>
-              <a:blip r:embed="rId12">
+              <a:blip r:embed="rId11">
                 <a:extLst>
                   <a:ext uri="{28A0092B-C50C-407E-A947-70E740481C1C}">
                     <a14:useLocalDpi xmlns:a14="http://schemas.microsoft.com/office/drawing/2010/main" val="0"/>
@@ -25563,7 +24808,7 @@
               <p:nvPr/>
             </p:nvPicPr>
             <p:blipFill>
-              <a:blip r:embed="rId13">
+              <a:blip r:embed="rId12">
                 <a:extLst>
                   <a:ext uri="{28A0092B-C50C-407E-A947-70E740481C1C}">
                     <a14:useLocalDpi xmlns:a14="http://schemas.microsoft.com/office/drawing/2010/main" val="0"/>
@@ -25579,228 +24824,6 @@
               <a:xfrm>
                 <a:off x="5789388" y="1529797"/>
                 <a:ext cx="376238" cy="257175"/>
-              </a:xfrm>
-              <a:prstGeom prst="rect">
-                <a:avLst/>
-              </a:prstGeom>
-              <a:noFill/>
-              <a:ln>
-                <a:noFill/>
-              </a:ln>
-              <a:extLst>
-                <a:ext uri="{909E8E84-426E-40DD-AFC4-6F175D3DCCD1}">
-                  <a14:hiddenFill xmlns:a14="http://schemas.microsoft.com/office/drawing/2010/main">
-                    <a:solidFill>
-                      <a:srgbClr val="FFFFFF"/>
-                    </a:solidFill>
-                  </a14:hiddenFill>
-                </a:ext>
-                <a:ext uri="{91240B29-F687-4F45-9708-019B960494DF}">
-                  <a14:hiddenLine xmlns:a14="http://schemas.microsoft.com/office/drawing/2010/main" w="9525">
-                    <a:solidFill>
-                      <a:srgbClr val="000000"/>
-                    </a:solidFill>
-                    <a:miter lim="800000"/>
-                    <a:headEnd/>
-                    <a:tailEnd/>
-                  </a14:hiddenLine>
-                </a:ext>
-              </a:extLst>
-            </p:spPr>
-          </p:pic>
-          <p:sp>
-            <p:nvSpPr>
-              <p:cNvPr id="48" name="Freeform 112"/>
-              <p:cNvSpPr>
-                <a:spLocks/>
-              </p:cNvSpPr>
-              <p:nvPr/>
-            </p:nvSpPr>
-            <p:spPr bwMode="auto">
-              <a:xfrm>
-                <a:off x="3373213" y="6128785"/>
-                <a:ext cx="1973263" cy="400050"/>
-              </a:xfrm>
-              <a:custGeom>
-                <a:avLst/>
-                <a:gdLst>
-                  <a:gd name="T0" fmla="*/ 2147483646 w 3687"/>
-                  <a:gd name="T1" fmla="*/ 2147483646 h 921"/>
-                  <a:gd name="T2" fmla="*/ 2147483646 w 3687"/>
-                  <a:gd name="T3" fmla="*/ 2147483646 h 921"/>
-                  <a:gd name="T4" fmla="*/ 2147483646 w 3687"/>
-                  <a:gd name="T5" fmla="*/ 2147483646 h 921"/>
-                  <a:gd name="T6" fmla="*/ 2147483646 w 3687"/>
-                  <a:gd name="T7" fmla="*/ 2147483646 h 921"/>
-                  <a:gd name="T8" fmla="*/ 2147483646 w 3687"/>
-                  <a:gd name="T9" fmla="*/ 0 h 921"/>
-                  <a:gd name="T10" fmla="*/ 2147483646 w 3687"/>
-                  <a:gd name="T11" fmla="*/ 0 h 921"/>
-                  <a:gd name="T12" fmla="*/ 2147483646 w 3687"/>
-                  <a:gd name="T13" fmla="*/ 0 h 921"/>
-                  <a:gd name="T14" fmla="*/ 0 w 3687"/>
-                  <a:gd name="T15" fmla="*/ 2147483646 h 921"/>
-                  <a:gd name="T16" fmla="*/ 0 w 3687"/>
-                  <a:gd name="T17" fmla="*/ 2147483646 h 921"/>
-                  <a:gd name="T18" fmla="*/ 0 w 3687"/>
-                  <a:gd name="T19" fmla="*/ 2147483646 h 921"/>
-                  <a:gd name="T20" fmla="*/ 2147483646 w 3687"/>
-                  <a:gd name="T21" fmla="*/ 2147483646 h 921"/>
-                  <a:gd name="T22" fmla="*/ 2147483646 w 3687"/>
-                  <a:gd name="T23" fmla="*/ 2147483646 h 921"/>
-                  <a:gd name="T24" fmla="*/ 2147483646 w 3687"/>
-                  <a:gd name="T25" fmla="*/ 2147483646 h 921"/>
-                  <a:gd name="T26" fmla="*/ 0 60000 65536"/>
-                  <a:gd name="T27" fmla="*/ 0 60000 65536"/>
-                  <a:gd name="T28" fmla="*/ 0 60000 65536"/>
-                  <a:gd name="T29" fmla="*/ 0 60000 65536"/>
-                  <a:gd name="T30" fmla="*/ 0 60000 65536"/>
-                  <a:gd name="T31" fmla="*/ 0 60000 65536"/>
-                  <a:gd name="T32" fmla="*/ 0 60000 65536"/>
-                  <a:gd name="T33" fmla="*/ 0 60000 65536"/>
-                  <a:gd name="T34" fmla="*/ 0 60000 65536"/>
-                  <a:gd name="T35" fmla="*/ 0 60000 65536"/>
-                  <a:gd name="T36" fmla="*/ 0 60000 65536"/>
-                  <a:gd name="T37" fmla="*/ 0 60000 65536"/>
-                  <a:gd name="T38" fmla="*/ 0 60000 65536"/>
-                </a:gdLst>
-                <a:ahLst/>
-                <a:cxnLst>
-                  <a:cxn ang="T26">
-                    <a:pos x="T0" y="T1"/>
-                  </a:cxn>
-                  <a:cxn ang="T27">
-                    <a:pos x="T2" y="T3"/>
-                  </a:cxn>
-                  <a:cxn ang="T28">
-                    <a:pos x="T4" y="T5"/>
-                  </a:cxn>
-                  <a:cxn ang="T29">
-                    <a:pos x="T6" y="T7"/>
-                  </a:cxn>
-                  <a:cxn ang="T30">
-                    <a:pos x="T8" y="T9"/>
-                  </a:cxn>
-                  <a:cxn ang="T31">
-                    <a:pos x="T10" y="T11"/>
-                  </a:cxn>
-                  <a:cxn ang="T32">
-                    <a:pos x="T12" y="T13"/>
-                  </a:cxn>
-                  <a:cxn ang="T33">
-                    <a:pos x="T14" y="T15"/>
-                  </a:cxn>
-                  <a:cxn ang="T34">
-                    <a:pos x="T16" y="T17"/>
-                  </a:cxn>
-                  <a:cxn ang="T35">
-                    <a:pos x="T18" y="T19"/>
-                  </a:cxn>
-                  <a:cxn ang="T36">
-                    <a:pos x="T20" y="T21"/>
-                  </a:cxn>
-                  <a:cxn ang="T37">
-                    <a:pos x="T22" y="T23"/>
-                  </a:cxn>
-                  <a:cxn ang="T38">
-                    <a:pos x="T24" y="T25"/>
-                  </a:cxn>
-                </a:cxnLst>
-                <a:rect l="0" t="0" r="r" b="b"/>
-                <a:pathLst>
-                  <a:path w="3687" h="921">
-                    <a:moveTo>
-                      <a:pt x="3495" y="921"/>
-                    </a:moveTo>
-                    <a:cubicBezTo>
-                      <a:pt x="3601" y="921"/>
-                      <a:pt x="3687" y="835"/>
-                      <a:pt x="3687" y="729"/>
-                    </a:cubicBezTo>
-                    <a:lnTo>
-                      <a:pt x="3687" y="192"/>
-                    </a:lnTo>
-                    <a:cubicBezTo>
-                      <a:pt x="3687" y="86"/>
-                      <a:pt x="3601" y="0"/>
-                      <a:pt x="3495" y="0"/>
-                    </a:cubicBezTo>
-                    <a:lnTo>
-                      <a:pt x="192" y="0"/>
-                    </a:lnTo>
-                    <a:cubicBezTo>
-                      <a:pt x="86" y="0"/>
-                      <a:pt x="0" y="86"/>
-                      <a:pt x="0" y="192"/>
-                    </a:cubicBezTo>
-                    <a:lnTo>
-                      <a:pt x="0" y="729"/>
-                    </a:lnTo>
-                    <a:cubicBezTo>
-                      <a:pt x="0" y="835"/>
-                      <a:pt x="86" y="921"/>
-                      <a:pt x="192" y="921"/>
-                    </a:cubicBezTo>
-                    <a:lnTo>
-                      <a:pt x="3495" y="921"/>
-                    </a:lnTo>
-                    <a:close/>
-                  </a:path>
-                </a:pathLst>
-              </a:custGeom>
-              <a:noFill/>
-              <a:ln w="14288" cap="rnd">
-                <a:solidFill>
-                  <a:srgbClr val="000000"/>
-                </a:solidFill>
-                <a:prstDash val="solid"/>
-                <a:round/>
-                <a:headEnd/>
-                <a:tailEnd/>
-              </a:ln>
-              <a:extLst>
-                <a:ext uri="{909E8E84-426E-40DD-AFC4-6F175D3DCCD1}">
-                  <a14:hiddenFill xmlns:a14="http://schemas.microsoft.com/office/drawing/2010/main">
-                    <a:solidFill>
-                      <a:srgbClr val="FFFFFF"/>
-                    </a:solidFill>
-                  </a14:hiddenFill>
-                </a:ext>
-              </a:extLst>
-            </p:spPr>
-            <p:txBody>
-              <a:bodyPr/>
-              <a:lstStyle/>
-              <a:p>
-                <a:endParaRPr lang="en-US"/>
-              </a:p>
-            </p:txBody>
-          </p:sp>
-          <p:pic>
-            <p:nvPicPr>
-              <p:cNvPr id="49" name="Picture 114"/>
-              <p:cNvPicPr>
-                <a:picLocks noChangeAspect="1" noChangeArrowheads="1"/>
-              </p:cNvPicPr>
-              <p:nvPr/>
-            </p:nvPicPr>
-            <p:blipFill>
-              <a:blip r:embed="rId14">
-                <a:extLst>
-                  <a:ext uri="{28A0092B-C50C-407E-A947-70E740481C1C}">
-                    <a14:useLocalDpi xmlns:a14="http://schemas.microsoft.com/office/drawing/2010/main" val="0"/>
-                  </a:ext>
-                </a:extLst>
-              </a:blip>
-              <a:srcRect/>
-              <a:stretch>
-                <a:fillRect/>
-              </a:stretch>
-            </p:blipFill>
-            <p:spPr bwMode="auto">
-              <a:xfrm>
-                <a:off x="3441475" y="6170540"/>
-                <a:ext cx="428625" cy="277813"/>
               </a:xfrm>
               <a:prstGeom prst="rect">
                 <a:avLst/>
@@ -26001,7 +25024,7 @@
               <p:nvPr/>
             </p:nvPicPr>
             <p:blipFill>
-              <a:blip r:embed="rId15">
+              <a:blip r:embed="rId13">
                 <a:extLst>
                   <a:ext uri="{28A0092B-C50C-407E-A947-70E740481C1C}">
                     <a14:useLocalDpi xmlns:a14="http://schemas.microsoft.com/office/drawing/2010/main" val="0"/>
@@ -26970,7 +25993,7 @@
               <p:nvPr/>
             </p:nvPicPr>
             <p:blipFill>
-              <a:blip r:embed="rId16">
+              <a:blip r:embed="rId14">
                 <a:extLst>
                   <a:ext uri="{28A0092B-C50C-407E-A947-70E740481C1C}">
                     <a14:useLocalDpi xmlns:a14="http://schemas.microsoft.com/office/drawing/2010/main" val="0"/>
@@ -27024,7 +26047,7 @@
               <p:nvPr/>
             </p:nvPicPr>
             <p:blipFill>
-              <a:blip r:embed="rId17">
+              <a:blip r:embed="rId15">
                 <a:extLst>
                   <a:ext uri="{28A0092B-C50C-407E-A947-70E740481C1C}">
                     <a14:useLocalDpi xmlns:a14="http://schemas.microsoft.com/office/drawing/2010/main" val="0"/>
@@ -27222,7 +26245,7 @@
               <p:nvPr/>
             </p:nvPicPr>
             <p:blipFill>
-              <a:blip r:embed="rId18">
+              <a:blip r:embed="rId16">
                 <a:extLst>
                   <a:ext uri="{28A0092B-C50C-407E-A947-70E740481C1C}">
                     <a14:useLocalDpi xmlns:a14="http://schemas.microsoft.com/office/drawing/2010/main" val="0"/>
@@ -27278,7 +26301,7 @@
             <p:spPr bwMode="auto">
               <a:xfrm>
                 <a:off x="6024338" y="5762072"/>
-                <a:ext cx="2219325" cy="300038"/>
+                <a:ext cx="2219324" cy="300038"/>
               </a:xfrm>
               <a:prstGeom prst="rect">
                 <a:avLst/>
@@ -27458,7 +26481,7 @@
             <p:spPr bwMode="auto">
               <a:xfrm>
                 <a:off x="6024338" y="5762072"/>
-                <a:ext cx="2219325" cy="300038"/>
+                <a:ext cx="2219324" cy="300038"/>
               </a:xfrm>
               <a:prstGeom prst="rect">
                 <a:avLst/>
@@ -27637,8 +26660,8 @@
             </p:nvSpPr>
             <p:spPr bwMode="auto">
               <a:xfrm>
-                <a:off x="5921150" y="5677935"/>
-                <a:ext cx="2219325" cy="301625"/>
+                <a:off x="5921151" y="5677935"/>
+                <a:ext cx="2219324" cy="301625"/>
               </a:xfrm>
               <a:prstGeom prst="rect">
                 <a:avLst/>
@@ -28191,7 +27214,7 @@
               <p:nvPr/>
             </p:nvPicPr>
             <p:blipFill>
-              <a:blip r:embed="rId19">
+              <a:blip r:embed="rId17">
                 <a:extLst>
                   <a:ext uri="{28A0092B-C50C-407E-A947-70E740481C1C}">
                     <a14:useLocalDpi xmlns:a14="http://schemas.microsoft.com/office/drawing/2010/main" val="0"/>
@@ -28245,7 +27268,7 @@
               <p:nvPr/>
             </p:nvPicPr>
             <p:blipFill>
-              <a:blip r:embed="rId20">
+              <a:blip r:embed="rId18">
                 <a:extLst>
                   <a:ext uri="{28A0092B-C50C-407E-A947-70E740481C1C}">
                     <a14:useLocalDpi xmlns:a14="http://schemas.microsoft.com/office/drawing/2010/main" val="0"/>
@@ -28260,7 +27283,7 @@
             <p:spPr bwMode="auto">
               <a:xfrm>
                 <a:off x="5951313" y="5701747"/>
-                <a:ext cx="376238" cy="257175"/>
+                <a:ext cx="376237" cy="257175"/>
               </a:xfrm>
               <a:prstGeom prst="rect">
                 <a:avLst/>
@@ -28443,7 +27466,7 @@
               <p:nvPr/>
             </p:nvPicPr>
             <p:blipFill>
-              <a:blip r:embed="rId21">
+              <a:blip r:embed="rId19">
                 <a:extLst>
                   <a:ext uri="{28A0092B-C50C-407E-A947-70E740481C1C}">
                     <a14:useLocalDpi xmlns:a14="http://schemas.microsoft.com/office/drawing/2010/main" val="0"/>
@@ -29177,554 +28200,6 @@
           </p:sp>
           <p:sp>
             <p:nvSpPr>
-              <p:cNvPr id="77" name="Freeform 147"/>
-              <p:cNvSpPr>
-                <a:spLocks/>
-              </p:cNvSpPr>
-              <p:nvPr/>
-            </p:nvSpPr>
-            <p:spPr bwMode="auto">
-              <a:xfrm>
-                <a:off x="6927625" y="5477910"/>
-                <a:ext cx="206375" cy="166688"/>
-              </a:xfrm>
-              <a:custGeom>
-                <a:avLst/>
-                <a:gdLst>
-                  <a:gd name="T0" fmla="*/ 0 w 384"/>
-                  <a:gd name="T1" fmla="*/ 2147483646 h 384"/>
-                  <a:gd name="T2" fmla="*/ 2147483646 w 384"/>
-                  <a:gd name="T3" fmla="*/ 0 h 384"/>
-                  <a:gd name="T4" fmla="*/ 2147483646 w 384"/>
-                  <a:gd name="T5" fmla="*/ 2147483646 h 384"/>
-                  <a:gd name="T6" fmla="*/ 2147483646 w 384"/>
-                  <a:gd name="T7" fmla="*/ 2147483646 h 384"/>
-                  <a:gd name="T8" fmla="*/ 2147483646 w 384"/>
-                  <a:gd name="T9" fmla="*/ 2147483646 h 384"/>
-                  <a:gd name="T10" fmla="*/ 0 w 384"/>
-                  <a:gd name="T11" fmla="*/ 2147483646 h 384"/>
-                  <a:gd name="T12" fmla="*/ 0 60000 65536"/>
-                  <a:gd name="T13" fmla="*/ 0 60000 65536"/>
-                  <a:gd name="T14" fmla="*/ 0 60000 65536"/>
-                  <a:gd name="T15" fmla="*/ 0 60000 65536"/>
-                  <a:gd name="T16" fmla="*/ 0 60000 65536"/>
-                  <a:gd name="T17" fmla="*/ 0 60000 65536"/>
-                </a:gdLst>
-                <a:ahLst/>
-                <a:cxnLst>
-                  <a:cxn ang="T12">
-                    <a:pos x="T0" y="T1"/>
-                  </a:cxn>
-                  <a:cxn ang="T13">
-                    <a:pos x="T2" y="T3"/>
-                  </a:cxn>
-                  <a:cxn ang="T14">
-                    <a:pos x="T4" y="T5"/>
-                  </a:cxn>
-                  <a:cxn ang="T15">
-                    <a:pos x="T6" y="T7"/>
-                  </a:cxn>
-                  <a:cxn ang="T16">
-                    <a:pos x="T8" y="T9"/>
-                  </a:cxn>
-                  <a:cxn ang="T17">
-                    <a:pos x="T10" y="T11"/>
-                  </a:cxn>
-                </a:cxnLst>
-                <a:rect l="0" t="0" r="r" b="b"/>
-                <a:pathLst>
-                  <a:path w="384" h="384">
-                    <a:moveTo>
-                      <a:pt x="0" y="192"/>
-                    </a:moveTo>
-                    <a:cubicBezTo>
-                      <a:pt x="0" y="86"/>
-                      <a:pt x="86" y="0"/>
-                      <a:pt x="192" y="0"/>
-                    </a:cubicBezTo>
-                    <a:cubicBezTo>
-                      <a:pt x="298" y="0"/>
-                      <a:pt x="384" y="86"/>
-                      <a:pt x="384" y="192"/>
-                    </a:cubicBezTo>
-                    <a:cubicBezTo>
-                      <a:pt x="384" y="192"/>
-                      <a:pt x="384" y="192"/>
-                      <a:pt x="384" y="192"/>
-                    </a:cubicBezTo>
-                    <a:cubicBezTo>
-                      <a:pt x="384" y="298"/>
-                      <a:pt x="298" y="384"/>
-                      <a:pt x="192" y="384"/>
-                    </a:cubicBezTo>
-                    <a:cubicBezTo>
-                      <a:pt x="86" y="384"/>
-                      <a:pt x="0" y="298"/>
-                      <a:pt x="0" y="192"/>
-                    </a:cubicBezTo>
-                  </a:path>
-                </a:pathLst>
-              </a:custGeom>
-              <a:solidFill>
-                <a:srgbClr val="C0C0C0"/>
-              </a:solidFill>
-              <a:ln w="0">
-                <a:solidFill>
-                  <a:srgbClr val="000000"/>
-                </a:solidFill>
-                <a:prstDash val="solid"/>
-                <a:round/>
-                <a:headEnd/>
-                <a:tailEnd/>
-              </a:ln>
-            </p:spPr>
-            <p:txBody>
-              <a:bodyPr/>
-              <a:lstStyle/>
-              <a:p>
-                <a:endParaRPr lang="en-US"/>
-              </a:p>
-            </p:txBody>
-          </p:sp>
-          <p:sp>
-            <p:nvSpPr>
-              <p:cNvPr id="78" name="Freeform 148"/>
-              <p:cNvSpPr>
-                <a:spLocks/>
-              </p:cNvSpPr>
-              <p:nvPr/>
-            </p:nvSpPr>
-            <p:spPr bwMode="auto">
-              <a:xfrm>
-                <a:off x="6927625" y="5477910"/>
-                <a:ext cx="206375" cy="166688"/>
-              </a:xfrm>
-              <a:custGeom>
-                <a:avLst/>
-                <a:gdLst>
-                  <a:gd name="T0" fmla="*/ 0 w 130"/>
-                  <a:gd name="T1" fmla="*/ 2147483646 h 105"/>
-                  <a:gd name="T2" fmla="*/ 2147483646 w 130"/>
-                  <a:gd name="T3" fmla="*/ 0 h 105"/>
-                  <a:gd name="T4" fmla="*/ 2147483646 w 130"/>
-                  <a:gd name="T5" fmla="*/ 2147483646 h 105"/>
-                  <a:gd name="T6" fmla="*/ 2147483646 w 130"/>
-                  <a:gd name="T7" fmla="*/ 2147483646 h 105"/>
-                  <a:gd name="T8" fmla="*/ 2147483646 w 130"/>
-                  <a:gd name="T9" fmla="*/ 2147483646 h 105"/>
-                  <a:gd name="T10" fmla="*/ 0 w 130"/>
-                  <a:gd name="T11" fmla="*/ 2147483646 h 105"/>
-                  <a:gd name="T12" fmla="*/ 0 60000 65536"/>
-                  <a:gd name="T13" fmla="*/ 0 60000 65536"/>
-                  <a:gd name="T14" fmla="*/ 0 60000 65536"/>
-                  <a:gd name="T15" fmla="*/ 0 60000 65536"/>
-                  <a:gd name="T16" fmla="*/ 0 60000 65536"/>
-                  <a:gd name="T17" fmla="*/ 0 60000 65536"/>
-                </a:gdLst>
-                <a:ahLst/>
-                <a:cxnLst>
-                  <a:cxn ang="T12">
-                    <a:pos x="T0" y="T1"/>
-                  </a:cxn>
-                  <a:cxn ang="T13">
-                    <a:pos x="T2" y="T3"/>
-                  </a:cxn>
-                  <a:cxn ang="T14">
-                    <a:pos x="T4" y="T5"/>
-                  </a:cxn>
-                  <a:cxn ang="T15">
-                    <a:pos x="T6" y="T7"/>
-                  </a:cxn>
-                  <a:cxn ang="T16">
-                    <a:pos x="T8" y="T9"/>
-                  </a:cxn>
-                  <a:cxn ang="T17">
-                    <a:pos x="T10" y="T11"/>
-                  </a:cxn>
-                </a:cxnLst>
-                <a:rect l="0" t="0" r="r" b="b"/>
-                <a:pathLst>
-                  <a:path w="130" h="105">
-                    <a:moveTo>
-                      <a:pt x="0" y="53"/>
-                    </a:moveTo>
-                    <a:cubicBezTo>
-                      <a:pt x="0" y="24"/>
-                      <a:pt x="29" y="0"/>
-                      <a:pt x="65" y="0"/>
-                    </a:cubicBezTo>
-                    <a:cubicBezTo>
-                      <a:pt x="101" y="0"/>
-                      <a:pt x="130" y="24"/>
-                      <a:pt x="130" y="53"/>
-                    </a:cubicBezTo>
-                    <a:cubicBezTo>
-                      <a:pt x="130" y="53"/>
-                      <a:pt x="130" y="53"/>
-                      <a:pt x="130" y="53"/>
-                    </a:cubicBezTo>
-                    <a:cubicBezTo>
-                      <a:pt x="130" y="82"/>
-                      <a:pt x="101" y="105"/>
-                      <a:pt x="65" y="105"/>
-                    </a:cubicBezTo>
-                    <a:cubicBezTo>
-                      <a:pt x="29" y="105"/>
-                      <a:pt x="0" y="82"/>
-                      <a:pt x="0" y="53"/>
-                    </a:cubicBezTo>
-                  </a:path>
-                </a:pathLst>
-              </a:custGeom>
-              <a:noFill/>
-              <a:ln w="3175" cap="rnd">
-                <a:solidFill>
-                  <a:srgbClr val="000000"/>
-                </a:solidFill>
-                <a:prstDash val="solid"/>
-                <a:round/>
-                <a:headEnd/>
-                <a:tailEnd/>
-              </a:ln>
-              <a:extLst>
-                <a:ext uri="{909E8E84-426E-40DD-AFC4-6F175D3DCCD1}">
-                  <a14:hiddenFill xmlns:a14="http://schemas.microsoft.com/office/drawing/2010/main">
-                    <a:solidFill>
-                      <a:srgbClr val="FFFFFF"/>
-                    </a:solidFill>
-                  </a14:hiddenFill>
-                </a:ext>
-              </a:extLst>
-            </p:spPr>
-            <p:txBody>
-              <a:bodyPr/>
-              <a:lstStyle/>
-              <a:p>
-                <a:endParaRPr lang="en-US"/>
-              </a:p>
-            </p:txBody>
-          </p:sp>
-          <p:sp>
-            <p:nvSpPr>
-              <p:cNvPr id="79" name="Freeform 149"/>
-              <p:cNvSpPr>
-                <a:spLocks/>
-              </p:cNvSpPr>
-              <p:nvPr/>
-            </p:nvSpPr>
-            <p:spPr bwMode="auto">
-              <a:xfrm>
-                <a:off x="4278088" y="5477910"/>
-                <a:ext cx="204788" cy="166688"/>
-              </a:xfrm>
-              <a:custGeom>
-                <a:avLst/>
-                <a:gdLst>
-                  <a:gd name="T0" fmla="*/ 0 w 384"/>
-                  <a:gd name="T1" fmla="*/ 2147483646 h 384"/>
-                  <a:gd name="T2" fmla="*/ 2147483646 w 384"/>
-                  <a:gd name="T3" fmla="*/ 0 h 384"/>
-                  <a:gd name="T4" fmla="*/ 2147483646 w 384"/>
-                  <a:gd name="T5" fmla="*/ 2147483646 h 384"/>
-                  <a:gd name="T6" fmla="*/ 2147483646 w 384"/>
-                  <a:gd name="T7" fmla="*/ 2147483646 h 384"/>
-                  <a:gd name="T8" fmla="*/ 2147483646 w 384"/>
-                  <a:gd name="T9" fmla="*/ 2147483646 h 384"/>
-                  <a:gd name="T10" fmla="*/ 0 w 384"/>
-                  <a:gd name="T11" fmla="*/ 2147483646 h 384"/>
-                  <a:gd name="T12" fmla="*/ 0 60000 65536"/>
-                  <a:gd name="T13" fmla="*/ 0 60000 65536"/>
-                  <a:gd name="T14" fmla="*/ 0 60000 65536"/>
-                  <a:gd name="T15" fmla="*/ 0 60000 65536"/>
-                  <a:gd name="T16" fmla="*/ 0 60000 65536"/>
-                  <a:gd name="T17" fmla="*/ 0 60000 65536"/>
-                </a:gdLst>
-                <a:ahLst/>
-                <a:cxnLst>
-                  <a:cxn ang="T12">
-                    <a:pos x="T0" y="T1"/>
-                  </a:cxn>
-                  <a:cxn ang="T13">
-                    <a:pos x="T2" y="T3"/>
-                  </a:cxn>
-                  <a:cxn ang="T14">
-                    <a:pos x="T4" y="T5"/>
-                  </a:cxn>
-                  <a:cxn ang="T15">
-                    <a:pos x="T6" y="T7"/>
-                  </a:cxn>
-                  <a:cxn ang="T16">
-                    <a:pos x="T8" y="T9"/>
-                  </a:cxn>
-                  <a:cxn ang="T17">
-                    <a:pos x="T10" y="T11"/>
-                  </a:cxn>
-                </a:cxnLst>
-                <a:rect l="0" t="0" r="r" b="b"/>
-                <a:pathLst>
-                  <a:path w="384" h="384">
-                    <a:moveTo>
-                      <a:pt x="0" y="192"/>
-                    </a:moveTo>
-                    <a:cubicBezTo>
-                      <a:pt x="0" y="86"/>
-                      <a:pt x="86" y="0"/>
-                      <a:pt x="192" y="0"/>
-                    </a:cubicBezTo>
-                    <a:cubicBezTo>
-                      <a:pt x="298" y="0"/>
-                      <a:pt x="384" y="86"/>
-                      <a:pt x="384" y="192"/>
-                    </a:cubicBezTo>
-                    <a:cubicBezTo>
-                      <a:pt x="384" y="192"/>
-                      <a:pt x="384" y="192"/>
-                      <a:pt x="384" y="192"/>
-                    </a:cubicBezTo>
-                    <a:cubicBezTo>
-                      <a:pt x="384" y="298"/>
-                      <a:pt x="298" y="384"/>
-                      <a:pt x="192" y="384"/>
-                    </a:cubicBezTo>
-                    <a:cubicBezTo>
-                      <a:pt x="86" y="384"/>
-                      <a:pt x="0" y="298"/>
-                      <a:pt x="0" y="192"/>
-                    </a:cubicBezTo>
-                  </a:path>
-                </a:pathLst>
-              </a:custGeom>
-              <a:solidFill>
-                <a:srgbClr val="C0C0C0"/>
-              </a:solidFill>
-              <a:ln w="0">
-                <a:solidFill>
-                  <a:srgbClr val="000000"/>
-                </a:solidFill>
-                <a:prstDash val="solid"/>
-                <a:round/>
-                <a:headEnd/>
-                <a:tailEnd/>
-              </a:ln>
-            </p:spPr>
-            <p:txBody>
-              <a:bodyPr/>
-              <a:lstStyle/>
-              <a:p>
-                <a:endParaRPr lang="en-US"/>
-              </a:p>
-            </p:txBody>
-          </p:sp>
-          <p:sp>
-            <p:nvSpPr>
-              <p:cNvPr id="80" name="Freeform 150"/>
-              <p:cNvSpPr>
-                <a:spLocks/>
-              </p:cNvSpPr>
-              <p:nvPr/>
-            </p:nvSpPr>
-            <p:spPr bwMode="auto">
-              <a:xfrm>
-                <a:off x="4278088" y="5477910"/>
-                <a:ext cx="204788" cy="166688"/>
-              </a:xfrm>
-              <a:custGeom>
-                <a:avLst/>
-                <a:gdLst>
-                  <a:gd name="T0" fmla="*/ 0 w 129"/>
-                  <a:gd name="T1" fmla="*/ 2147483646 h 105"/>
-                  <a:gd name="T2" fmla="*/ 2147483646 w 129"/>
-                  <a:gd name="T3" fmla="*/ 0 h 105"/>
-                  <a:gd name="T4" fmla="*/ 2147483646 w 129"/>
-                  <a:gd name="T5" fmla="*/ 2147483646 h 105"/>
-                  <a:gd name="T6" fmla="*/ 2147483646 w 129"/>
-                  <a:gd name="T7" fmla="*/ 2147483646 h 105"/>
-                  <a:gd name="T8" fmla="*/ 2147483646 w 129"/>
-                  <a:gd name="T9" fmla="*/ 2147483646 h 105"/>
-                  <a:gd name="T10" fmla="*/ 0 w 129"/>
-                  <a:gd name="T11" fmla="*/ 2147483646 h 105"/>
-                  <a:gd name="T12" fmla="*/ 0 60000 65536"/>
-                  <a:gd name="T13" fmla="*/ 0 60000 65536"/>
-                  <a:gd name="T14" fmla="*/ 0 60000 65536"/>
-                  <a:gd name="T15" fmla="*/ 0 60000 65536"/>
-                  <a:gd name="T16" fmla="*/ 0 60000 65536"/>
-                  <a:gd name="T17" fmla="*/ 0 60000 65536"/>
-                </a:gdLst>
-                <a:ahLst/>
-                <a:cxnLst>
-                  <a:cxn ang="T12">
-                    <a:pos x="T0" y="T1"/>
-                  </a:cxn>
-                  <a:cxn ang="T13">
-                    <a:pos x="T2" y="T3"/>
-                  </a:cxn>
-                  <a:cxn ang="T14">
-                    <a:pos x="T4" y="T5"/>
-                  </a:cxn>
-                  <a:cxn ang="T15">
-                    <a:pos x="T6" y="T7"/>
-                  </a:cxn>
-                  <a:cxn ang="T16">
-                    <a:pos x="T8" y="T9"/>
-                  </a:cxn>
-                  <a:cxn ang="T17">
-                    <a:pos x="T10" y="T11"/>
-                  </a:cxn>
-                </a:cxnLst>
-                <a:rect l="0" t="0" r="r" b="b"/>
-                <a:pathLst>
-                  <a:path w="129" h="105">
-                    <a:moveTo>
-                      <a:pt x="0" y="53"/>
-                    </a:moveTo>
-                    <a:cubicBezTo>
-                      <a:pt x="0" y="24"/>
-                      <a:pt x="29" y="0"/>
-                      <a:pt x="65" y="0"/>
-                    </a:cubicBezTo>
-                    <a:cubicBezTo>
-                      <a:pt x="100" y="0"/>
-                      <a:pt x="129" y="24"/>
-                      <a:pt x="129" y="53"/>
-                    </a:cubicBezTo>
-                    <a:cubicBezTo>
-                      <a:pt x="129" y="53"/>
-                      <a:pt x="129" y="53"/>
-                      <a:pt x="129" y="53"/>
-                    </a:cubicBezTo>
-                    <a:cubicBezTo>
-                      <a:pt x="129" y="82"/>
-                      <a:pt x="100" y="105"/>
-                      <a:pt x="65" y="105"/>
-                    </a:cubicBezTo>
-                    <a:cubicBezTo>
-                      <a:pt x="29" y="105"/>
-                      <a:pt x="0" y="82"/>
-                      <a:pt x="0" y="53"/>
-                    </a:cubicBezTo>
-                  </a:path>
-                </a:pathLst>
-              </a:custGeom>
-              <a:noFill/>
-              <a:ln w="3175" cap="rnd">
-                <a:solidFill>
-                  <a:srgbClr val="000000"/>
-                </a:solidFill>
-                <a:prstDash val="solid"/>
-                <a:round/>
-                <a:headEnd/>
-                <a:tailEnd/>
-              </a:ln>
-              <a:extLst>
-                <a:ext uri="{909E8E84-426E-40DD-AFC4-6F175D3DCCD1}">
-                  <a14:hiddenFill xmlns:a14="http://schemas.microsoft.com/office/drawing/2010/main">
-                    <a:solidFill>
-                      <a:srgbClr val="FFFFFF"/>
-                    </a:solidFill>
-                  </a14:hiddenFill>
-                </a:ext>
-              </a:extLst>
-            </p:spPr>
-            <p:txBody>
-              <a:bodyPr/>
-              <a:lstStyle/>
-              <a:p>
-                <a:endParaRPr lang="en-US"/>
-              </a:p>
-            </p:txBody>
-          </p:sp>
-          <p:sp>
-            <p:nvSpPr>
-              <p:cNvPr id="81" name="Freeform 151"/>
-              <p:cNvSpPr>
-                <a:spLocks/>
-              </p:cNvSpPr>
-              <p:nvPr/>
-            </p:nvSpPr>
-            <p:spPr bwMode="auto">
-              <a:xfrm>
-                <a:off x="4381275" y="5119134"/>
-                <a:ext cx="1231900" cy="358776"/>
-              </a:xfrm>
-              <a:custGeom>
-                <a:avLst/>
-                <a:gdLst>
-                  <a:gd name="T0" fmla="*/ 0 w 776"/>
-                  <a:gd name="T1" fmla="*/ 2147483646 h 189"/>
-                  <a:gd name="T2" fmla="*/ 0 w 776"/>
-                  <a:gd name="T3" fmla="*/ 2147483646 h 189"/>
-                  <a:gd name="T4" fmla="*/ 2147483646 w 776"/>
-                  <a:gd name="T5" fmla="*/ 2147483646 h 189"/>
-                  <a:gd name="T6" fmla="*/ 2147483646 w 776"/>
-                  <a:gd name="T7" fmla="*/ 0 h 189"/>
-                  <a:gd name="T8" fmla="*/ 0 60000 65536"/>
-                  <a:gd name="T9" fmla="*/ 0 60000 65536"/>
-                  <a:gd name="T10" fmla="*/ 0 60000 65536"/>
-                  <a:gd name="T11" fmla="*/ 0 60000 65536"/>
-                </a:gdLst>
-                <a:ahLst/>
-                <a:cxnLst>
-                  <a:cxn ang="T8">
-                    <a:pos x="T0" y="T1"/>
-                  </a:cxn>
-                  <a:cxn ang="T9">
-                    <a:pos x="T2" y="T3"/>
-                  </a:cxn>
-                  <a:cxn ang="T10">
-                    <a:pos x="T4" y="T5"/>
-                  </a:cxn>
-                  <a:cxn ang="T11">
-                    <a:pos x="T6" y="T7"/>
-                  </a:cxn>
-                </a:cxnLst>
-                <a:rect l="0" t="0" r="r" b="b"/>
-                <a:pathLst>
-                  <a:path w="776" h="189">
-                    <a:moveTo>
-                      <a:pt x="0" y="189"/>
-                    </a:moveTo>
-                    <a:lnTo>
-                      <a:pt x="0" y="58"/>
-                    </a:lnTo>
-                    <a:lnTo>
-                      <a:pt x="776" y="58"/>
-                    </a:lnTo>
-                    <a:lnTo>
-                      <a:pt x="776" y="0"/>
-                    </a:lnTo>
-                  </a:path>
-                </a:pathLst>
-              </a:custGeom>
-              <a:noFill/>
-              <a:ln w="36513" cap="rnd">
-                <a:solidFill>
-                  <a:srgbClr val="4677BF"/>
-                </a:solidFill>
-                <a:prstDash val="solid"/>
-                <a:round/>
-                <a:headEnd/>
-                <a:tailEnd/>
-              </a:ln>
-              <a:extLst>
-                <a:ext uri="{909E8E84-426E-40DD-AFC4-6F175D3DCCD1}">
-                  <a14:hiddenFill xmlns:a14="http://schemas.microsoft.com/office/drawing/2010/main">
-                    <a:solidFill>
-                      <a:srgbClr val="FFFFFF"/>
-                    </a:solidFill>
-                  </a14:hiddenFill>
-                </a:ext>
-              </a:extLst>
-            </p:spPr>
-            <p:txBody>
-              <a:bodyPr/>
-              <a:lstStyle/>
-              <a:p>
-                <a:endParaRPr lang="en-US"/>
-              </a:p>
-            </p:txBody>
-          </p:sp>
-          <p:sp>
-            <p:nvSpPr>
               <p:cNvPr id="82" name="Freeform 152"/>
               <p:cNvSpPr>
                 <a:spLocks/>
@@ -30345,87 +28820,6 @@
           </p:sp>
           <p:sp>
             <p:nvSpPr>
-              <p:cNvPr id="88" name="Freeform 158"/>
-              <p:cNvSpPr>
-                <a:spLocks/>
-              </p:cNvSpPr>
-              <p:nvPr/>
-            </p:nvSpPr>
-            <p:spPr bwMode="auto">
-              <a:xfrm>
-                <a:off x="5623933" y="5209041"/>
-                <a:ext cx="1409437" cy="241991"/>
-              </a:xfrm>
-              <a:custGeom>
-                <a:avLst/>
-                <a:gdLst>
-                  <a:gd name="T0" fmla="*/ 2147483646 w 893"/>
-                  <a:gd name="T1" fmla="*/ 2147483646 h 79"/>
-                  <a:gd name="T2" fmla="*/ 2147483646 w 893"/>
-                  <a:gd name="T3" fmla="*/ 0 h 79"/>
-                  <a:gd name="T4" fmla="*/ 0 w 893"/>
-                  <a:gd name="T5" fmla="*/ 0 h 79"/>
-                  <a:gd name="T6" fmla="*/ 0 60000 65536"/>
-                  <a:gd name="T7" fmla="*/ 0 60000 65536"/>
-                  <a:gd name="T8" fmla="*/ 0 60000 65536"/>
-                </a:gdLst>
-                <a:ahLst/>
-                <a:cxnLst>
-                  <a:cxn ang="T6">
-                    <a:pos x="T0" y="T1"/>
-                  </a:cxn>
-                  <a:cxn ang="T7">
-                    <a:pos x="T2" y="T3"/>
-                  </a:cxn>
-                  <a:cxn ang="T8">
-                    <a:pos x="T4" y="T5"/>
-                  </a:cxn>
-                </a:cxnLst>
-                <a:rect l="0" t="0" r="r" b="b"/>
-                <a:pathLst>
-                  <a:path w="893" h="79">
-                    <a:moveTo>
-                      <a:pt x="893" y="79"/>
-                    </a:moveTo>
-                    <a:lnTo>
-                      <a:pt x="893" y="0"/>
-                    </a:lnTo>
-                    <a:lnTo>
-                      <a:pt x="0" y="0"/>
-                    </a:lnTo>
-                  </a:path>
-                </a:pathLst>
-              </a:custGeom>
-              <a:noFill/>
-              <a:ln w="36513" cap="rnd">
-                <a:solidFill>
-                  <a:srgbClr val="4677BF"/>
-                </a:solidFill>
-                <a:prstDash val="solid"/>
-                <a:round/>
-                <a:headEnd/>
-                <a:tailEnd/>
-              </a:ln>
-              <a:extLst>
-                <a:ext uri="{909E8E84-426E-40DD-AFC4-6F175D3DCCD1}">
-                  <a14:hiddenFill xmlns:a14="http://schemas.microsoft.com/office/drawing/2010/main">
-                    <a:solidFill>
-                      <a:srgbClr val="FFFFFF"/>
-                    </a:solidFill>
-                  </a14:hiddenFill>
-                </a:ext>
-              </a:extLst>
-            </p:spPr>
-            <p:txBody>
-              <a:bodyPr/>
-              <a:lstStyle/>
-              <a:p>
-                <a:endParaRPr lang="en-US"/>
-              </a:p>
-            </p:txBody>
-          </p:sp>
-          <p:sp>
-            <p:nvSpPr>
               <p:cNvPr id="89" name="Freeform 160"/>
               <p:cNvSpPr>
                 <a:spLocks/>
@@ -31661,196 +30055,6 @@
           </p:sp>
           <p:sp>
             <p:nvSpPr>
-              <p:cNvPr id="98" name="TextBox 96"/>
-              <p:cNvSpPr txBox="1">
-                <a:spLocks noChangeArrowheads="1"/>
-              </p:cNvSpPr>
-              <p:nvPr/>
-            </p:nvSpPr>
-            <p:spPr bwMode="auto">
-              <a:xfrm>
-                <a:off x="4037620" y="6137078"/>
-                <a:ext cx="821237" cy="315788"/>
-              </a:xfrm>
-              <a:prstGeom prst="rect">
-                <a:avLst/>
-              </a:prstGeom>
-              <a:noFill/>
-              <a:ln>
-                <a:noFill/>
-              </a:ln>
-              <a:extLst>
-                <a:ext uri="{909E8E84-426E-40DD-AFC4-6F175D3DCCD1}">
-                  <a14:hiddenFill xmlns:a14="http://schemas.microsoft.com/office/drawing/2010/main">
-                    <a:solidFill>
-                      <a:srgbClr val="FFFFFF"/>
-                    </a:solidFill>
-                  </a14:hiddenFill>
-                </a:ext>
-                <a:ext uri="{91240B29-F687-4F45-9708-019B960494DF}">
-                  <a14:hiddenLine xmlns:a14="http://schemas.microsoft.com/office/drawing/2010/main" w="9525">
-                    <a:solidFill>
-                      <a:srgbClr val="000000"/>
-                    </a:solidFill>
-                    <a:miter lim="800000"/>
-                    <a:headEnd/>
-                    <a:tailEnd/>
-                  </a14:hiddenLine>
-                </a:ext>
-              </a:extLst>
-            </p:spPr>
-            <p:txBody>
-              <a:bodyPr wrap="none">
-                <a:spAutoFit/>
-              </a:bodyPr>
-              <a:lstStyle>
-                <a:lvl1pPr>
-                  <a:spcBef>
-                    <a:spcPct val="20000"/>
-                  </a:spcBef>
-                  <a:buChar char="•"/>
-                  <a:defRPr kumimoji="1" sz="2000">
-                    <a:solidFill>
-                      <a:schemeClr val="tx1"/>
-                    </a:solidFill>
-                    <a:latin typeface="Arial" panose="020B0604020202020204" pitchFamily="34" charset="0"/>
-                    <a:ea typeface="ＭＳ Ｐゴシック" panose="020B0600070205080204" pitchFamily="34" charset="-128"/>
-                  </a:defRPr>
-                </a:lvl1pPr>
-                <a:lvl2pPr marL="742950" indent="-285750">
-                  <a:spcBef>
-                    <a:spcPct val="20000"/>
-                  </a:spcBef>
-                  <a:buChar char="–"/>
-                  <a:defRPr kumimoji="1" sz="2800">
-                    <a:solidFill>
-                      <a:schemeClr val="tx1"/>
-                    </a:solidFill>
-                    <a:latin typeface="Arial" panose="020B0604020202020204" pitchFamily="34" charset="0"/>
-                    <a:ea typeface="ＭＳ Ｐゴシック" panose="020B0600070205080204" pitchFamily="34" charset="-128"/>
-                  </a:defRPr>
-                </a:lvl2pPr>
-                <a:lvl3pPr marL="1143000" indent="-228600">
-                  <a:spcBef>
-                    <a:spcPct val="20000"/>
-                  </a:spcBef>
-                  <a:buChar char="•"/>
-                  <a:defRPr kumimoji="1" sz="1600">
-                    <a:solidFill>
-                      <a:schemeClr val="tx1"/>
-                    </a:solidFill>
-                    <a:latin typeface="Arial" panose="020B0604020202020204" pitchFamily="34" charset="0"/>
-                    <a:ea typeface="ＭＳ Ｐゴシック" panose="020B0600070205080204" pitchFamily="34" charset="-128"/>
-                  </a:defRPr>
-                </a:lvl3pPr>
-                <a:lvl4pPr marL="1600200" indent="-228600">
-                  <a:spcBef>
-                    <a:spcPct val="20000"/>
-                  </a:spcBef>
-                  <a:buChar char="–"/>
-                  <a:defRPr kumimoji="1" sz="1400">
-                    <a:solidFill>
-                      <a:schemeClr val="tx1"/>
-                    </a:solidFill>
-                    <a:latin typeface="Arial" panose="020B0604020202020204" pitchFamily="34" charset="0"/>
-                    <a:ea typeface="ＭＳ Ｐゴシック" panose="020B0600070205080204" pitchFamily="34" charset="-128"/>
-                  </a:defRPr>
-                </a:lvl4pPr>
-                <a:lvl5pPr marL="2057400" indent="-228600">
-                  <a:spcBef>
-                    <a:spcPct val="20000"/>
-                  </a:spcBef>
-                  <a:buChar char="»"/>
-                  <a:defRPr kumimoji="1" sz="1200">
-                    <a:solidFill>
-                      <a:schemeClr val="tx1"/>
-                    </a:solidFill>
-                    <a:latin typeface="Arial" panose="020B0604020202020204" pitchFamily="34" charset="0"/>
-                    <a:ea typeface="ＭＳ Ｐゴシック" panose="020B0600070205080204" pitchFamily="34" charset="-128"/>
-                  </a:defRPr>
-                </a:lvl5pPr>
-                <a:lvl6pPr marL="2514600" indent="-228600" eaLnBrk="0" fontAlgn="base" hangingPunct="0">
-                  <a:spcBef>
-                    <a:spcPct val="20000"/>
-                  </a:spcBef>
-                  <a:spcAft>
-                    <a:spcPct val="0"/>
-                  </a:spcAft>
-                  <a:buChar char="»"/>
-                  <a:defRPr kumimoji="1" sz="1200">
-                    <a:solidFill>
-                      <a:schemeClr val="tx1"/>
-                    </a:solidFill>
-                    <a:latin typeface="Arial" panose="020B0604020202020204" pitchFamily="34" charset="0"/>
-                    <a:ea typeface="ＭＳ Ｐゴシック" panose="020B0600070205080204" pitchFamily="34" charset="-128"/>
-                  </a:defRPr>
-                </a:lvl6pPr>
-                <a:lvl7pPr marL="2971800" indent="-228600" eaLnBrk="0" fontAlgn="base" hangingPunct="0">
-                  <a:spcBef>
-                    <a:spcPct val="20000"/>
-                  </a:spcBef>
-                  <a:spcAft>
-                    <a:spcPct val="0"/>
-                  </a:spcAft>
-                  <a:buChar char="»"/>
-                  <a:defRPr kumimoji="1" sz="1200">
-                    <a:solidFill>
-                      <a:schemeClr val="tx1"/>
-                    </a:solidFill>
-                    <a:latin typeface="Arial" panose="020B0604020202020204" pitchFamily="34" charset="0"/>
-                    <a:ea typeface="ＭＳ Ｐゴシック" panose="020B0600070205080204" pitchFamily="34" charset="-128"/>
-                  </a:defRPr>
-                </a:lvl7pPr>
-                <a:lvl8pPr marL="3429000" indent="-228600" eaLnBrk="0" fontAlgn="base" hangingPunct="0">
-                  <a:spcBef>
-                    <a:spcPct val="20000"/>
-                  </a:spcBef>
-                  <a:spcAft>
-                    <a:spcPct val="0"/>
-                  </a:spcAft>
-                  <a:buChar char="»"/>
-                  <a:defRPr kumimoji="1" sz="1200">
-                    <a:solidFill>
-                      <a:schemeClr val="tx1"/>
-                    </a:solidFill>
-                    <a:latin typeface="Arial" panose="020B0604020202020204" pitchFamily="34" charset="0"/>
-                    <a:ea typeface="ＭＳ Ｐゴシック" panose="020B0600070205080204" pitchFamily="34" charset="-128"/>
-                  </a:defRPr>
-                </a:lvl8pPr>
-                <a:lvl9pPr marL="3886200" indent="-228600" eaLnBrk="0" fontAlgn="base" hangingPunct="0">
-                  <a:spcBef>
-                    <a:spcPct val="20000"/>
-                  </a:spcBef>
-                  <a:spcAft>
-                    <a:spcPct val="0"/>
-                  </a:spcAft>
-                  <a:buChar char="»"/>
-                  <a:defRPr kumimoji="1" sz="1200">
-                    <a:solidFill>
-                      <a:schemeClr val="tx1"/>
-                    </a:solidFill>
-                    <a:latin typeface="Arial" panose="020B0604020202020204" pitchFamily="34" charset="0"/>
-                    <a:ea typeface="ＭＳ Ｐゴシック" panose="020B0600070205080204" pitchFamily="34" charset="-128"/>
-                  </a:defRPr>
-                </a:lvl9pPr>
-              </a:lstStyle>
-              <a:p>
-                <a:pPr>
-                  <a:spcBef>
-                    <a:spcPct val="0"/>
-                  </a:spcBef>
-                  <a:buFontTx/>
-                  <a:buNone/>
-                </a:pPr>
-                <a:r>
-                  <a:rPr kumimoji="0" lang="en-US" altLang="en-US" sz="1200" b="1"/>
-                  <a:t>Quality</a:t>
-                </a:r>
-              </a:p>
-            </p:txBody>
-          </p:sp>
-          <p:sp>
-            <p:nvSpPr>
               <p:cNvPr id="99" name="TextBox 97"/>
               <p:cNvSpPr txBox="1">
                 <a:spLocks noChangeArrowheads="1"/>
@@ -32964,7 +31168,7 @@
               <p:nvPr/>
             </p:nvPicPr>
             <p:blipFill>
-              <a:blip r:embed="rId16">
+              <a:blip r:embed="rId14">
                 <a:extLst>
                   <a:ext uri="{28A0092B-C50C-407E-A947-70E740481C1C}">
                     <a14:useLocalDpi xmlns:a14="http://schemas.microsoft.com/office/drawing/2010/main" val="0"/>
@@ -33018,7 +31222,7 @@
               <p:nvPr/>
             </p:nvPicPr>
             <p:blipFill>
-              <a:blip r:embed="rId17">
+              <a:blip r:embed="rId15">
                 <a:extLst>
                   <a:ext uri="{28A0092B-C50C-407E-A947-70E740481C1C}">
                     <a14:useLocalDpi xmlns:a14="http://schemas.microsoft.com/office/drawing/2010/main" val="0"/>
@@ -33216,7 +31420,7 @@
               <p:nvPr/>
             </p:nvPicPr>
             <p:blipFill>
-              <a:blip r:embed="rId18">
+              <a:blip r:embed="rId16">
                 <a:extLst>
                   <a:ext uri="{28A0092B-C50C-407E-A947-70E740481C1C}">
                     <a14:useLocalDpi xmlns:a14="http://schemas.microsoft.com/office/drawing/2010/main" val="0"/>
@@ -33848,233 +32052,6 @@
           </p:txBody>
         </p:sp>
       </p:grpSp>
-      <p:sp>
-        <p:nvSpPr>
-          <p:cNvPr id="116" name="TextBox 5"/>
-          <p:cNvSpPr txBox="1">
-            <a:spLocks noChangeArrowheads="1"/>
-          </p:cNvSpPr>
-          <p:nvPr/>
-        </p:nvSpPr>
-        <p:spPr bwMode="auto">
-          <a:xfrm>
-            <a:off x="390465" y="657225"/>
-            <a:ext cx="7550465" cy="430887"/>
-          </a:xfrm>
-          <a:prstGeom prst="rect">
-            <a:avLst/>
-          </a:prstGeom>
-          <a:noFill/>
-          <a:ln>
-            <a:noFill/>
-          </a:ln>
-          <a:extLst>
-            <a:ext uri="{909E8E84-426E-40DD-AFC4-6F175D3DCCD1}">
-              <a14:hiddenFill xmlns:a14="http://schemas.microsoft.com/office/drawing/2010/main">
-                <a:solidFill>
-                  <a:srgbClr val="FFFFFF"/>
-                </a:solidFill>
-              </a14:hiddenFill>
-            </a:ext>
-            <a:ext uri="{91240B29-F687-4F45-9708-019B960494DF}">
-              <a14:hiddenLine xmlns:a14="http://schemas.microsoft.com/office/drawing/2010/main" w="9525">
-                <a:solidFill>
-                  <a:srgbClr val="000000"/>
-                </a:solidFill>
-                <a:miter lim="800000"/>
-                <a:headEnd/>
-                <a:tailEnd/>
-              </a14:hiddenLine>
-            </a:ext>
-          </a:extLst>
-        </p:spPr>
-        <p:txBody>
-          <a:bodyPr wrap="none">
-            <a:spAutoFit/>
-          </a:bodyPr>
-          <a:lstStyle>
-            <a:lvl1pPr>
-              <a:spcBef>
-                <a:spcPct val="20000"/>
-              </a:spcBef>
-              <a:buChar char="•"/>
-              <a:defRPr kumimoji="1" sz="2000">
-                <a:solidFill>
-                  <a:schemeClr val="tx1"/>
-                </a:solidFill>
-                <a:latin typeface="Arial" panose="020B0604020202020204" pitchFamily="34" charset="0"/>
-                <a:ea typeface="ＭＳ Ｐゴシック" panose="020B0600070205080204" pitchFamily="34" charset="-128"/>
-              </a:defRPr>
-            </a:lvl1pPr>
-            <a:lvl2pPr marL="742950" indent="-285750">
-              <a:spcBef>
-                <a:spcPct val="20000"/>
-              </a:spcBef>
-              <a:buChar char="–"/>
-              <a:defRPr kumimoji="1" sz="2800">
-                <a:solidFill>
-                  <a:schemeClr val="tx1"/>
-                </a:solidFill>
-                <a:latin typeface="Arial" panose="020B0604020202020204" pitchFamily="34" charset="0"/>
-                <a:ea typeface="ＭＳ Ｐゴシック" panose="020B0600070205080204" pitchFamily="34" charset="-128"/>
-              </a:defRPr>
-            </a:lvl2pPr>
-            <a:lvl3pPr marL="1143000" indent="-228600">
-              <a:spcBef>
-                <a:spcPct val="20000"/>
-              </a:spcBef>
-              <a:buChar char="•"/>
-              <a:defRPr kumimoji="1" sz="1600">
-                <a:solidFill>
-                  <a:schemeClr val="tx1"/>
-                </a:solidFill>
-                <a:latin typeface="Arial" panose="020B0604020202020204" pitchFamily="34" charset="0"/>
-                <a:ea typeface="ＭＳ Ｐゴシック" panose="020B0600070205080204" pitchFamily="34" charset="-128"/>
-              </a:defRPr>
-            </a:lvl3pPr>
-            <a:lvl4pPr marL="1600200" indent="-228600">
-              <a:spcBef>
-                <a:spcPct val="20000"/>
-              </a:spcBef>
-              <a:buChar char="–"/>
-              <a:defRPr kumimoji="1" sz="1400">
-                <a:solidFill>
-                  <a:schemeClr val="tx1"/>
-                </a:solidFill>
-                <a:latin typeface="Arial" panose="020B0604020202020204" pitchFamily="34" charset="0"/>
-                <a:ea typeface="ＭＳ Ｐゴシック" panose="020B0600070205080204" pitchFamily="34" charset="-128"/>
-              </a:defRPr>
-            </a:lvl4pPr>
-            <a:lvl5pPr marL="2057400" indent="-228600">
-              <a:spcBef>
-                <a:spcPct val="20000"/>
-              </a:spcBef>
-              <a:buChar char="»"/>
-              <a:defRPr kumimoji="1" sz="1200">
-                <a:solidFill>
-                  <a:schemeClr val="tx1"/>
-                </a:solidFill>
-                <a:latin typeface="Arial" panose="020B0604020202020204" pitchFamily="34" charset="0"/>
-                <a:ea typeface="ＭＳ Ｐゴシック" panose="020B0600070205080204" pitchFamily="34" charset="-128"/>
-              </a:defRPr>
-            </a:lvl5pPr>
-            <a:lvl6pPr marL="2514600" indent="-228600" eaLnBrk="0" fontAlgn="base" hangingPunct="0">
-              <a:spcBef>
-                <a:spcPct val="20000"/>
-              </a:spcBef>
-              <a:spcAft>
-                <a:spcPct val="0"/>
-              </a:spcAft>
-              <a:buChar char="»"/>
-              <a:defRPr kumimoji="1" sz="1200">
-                <a:solidFill>
-                  <a:schemeClr val="tx1"/>
-                </a:solidFill>
-                <a:latin typeface="Arial" panose="020B0604020202020204" pitchFamily="34" charset="0"/>
-                <a:ea typeface="ＭＳ Ｐゴシック" panose="020B0600070205080204" pitchFamily="34" charset="-128"/>
-              </a:defRPr>
-            </a:lvl6pPr>
-            <a:lvl7pPr marL="2971800" indent="-228600" eaLnBrk="0" fontAlgn="base" hangingPunct="0">
-              <a:spcBef>
-                <a:spcPct val="20000"/>
-              </a:spcBef>
-              <a:spcAft>
-                <a:spcPct val="0"/>
-              </a:spcAft>
-              <a:buChar char="»"/>
-              <a:defRPr kumimoji="1" sz="1200">
-                <a:solidFill>
-                  <a:schemeClr val="tx1"/>
-                </a:solidFill>
-                <a:latin typeface="Arial" panose="020B0604020202020204" pitchFamily="34" charset="0"/>
-                <a:ea typeface="ＭＳ Ｐゴシック" panose="020B0600070205080204" pitchFamily="34" charset="-128"/>
-              </a:defRPr>
-            </a:lvl7pPr>
-            <a:lvl8pPr marL="3429000" indent="-228600" eaLnBrk="0" fontAlgn="base" hangingPunct="0">
-              <a:spcBef>
-                <a:spcPct val="20000"/>
-              </a:spcBef>
-              <a:spcAft>
-                <a:spcPct val="0"/>
-              </a:spcAft>
-              <a:buChar char="»"/>
-              <a:defRPr kumimoji="1" sz="1200">
-                <a:solidFill>
-                  <a:schemeClr val="tx1"/>
-                </a:solidFill>
-                <a:latin typeface="Arial" panose="020B0604020202020204" pitchFamily="34" charset="0"/>
-                <a:ea typeface="ＭＳ Ｐゴシック" panose="020B0600070205080204" pitchFamily="34" charset="-128"/>
-              </a:defRPr>
-            </a:lvl8pPr>
-            <a:lvl9pPr marL="3886200" indent="-228600" eaLnBrk="0" fontAlgn="base" hangingPunct="0">
-              <a:spcBef>
-                <a:spcPct val="20000"/>
-              </a:spcBef>
-              <a:spcAft>
-                <a:spcPct val="0"/>
-              </a:spcAft>
-              <a:buChar char="»"/>
-              <a:defRPr kumimoji="1" sz="1200">
-                <a:solidFill>
-                  <a:schemeClr val="tx1"/>
-                </a:solidFill>
-                <a:latin typeface="Arial" panose="020B0604020202020204" pitchFamily="34" charset="0"/>
-                <a:ea typeface="ＭＳ Ｐゴシック" panose="020B0600070205080204" pitchFamily="34" charset="-128"/>
-              </a:defRPr>
-            </a:lvl9pPr>
-          </a:lstStyle>
-          <a:p>
-            <a:pPr>
-              <a:spcBef>
-                <a:spcPct val="0"/>
-              </a:spcBef>
-              <a:buFontTx/>
-              <a:buNone/>
-            </a:pPr>
-            <a:r>
-              <a:rPr kumimoji="0" lang="en-US" altLang="en-US" sz="2200" b="1" dirty="0" smtClean="0"/>
-              <a:t>Mapping / </a:t>
-            </a:r>
-            <a:r>
-              <a:rPr kumimoji="0" lang="en-US" altLang="en-US" sz="2200" b="1" dirty="0" err="1" smtClean="0"/>
-              <a:t>Pemetaan</a:t>
-            </a:r>
-            <a:r>
-              <a:rPr kumimoji="0" lang="en-US" altLang="en-US" sz="2200" b="1" dirty="0" smtClean="0"/>
-              <a:t> </a:t>
-            </a:r>
-            <a:r>
-              <a:rPr kumimoji="0" lang="en-US" altLang="en-US" sz="2200" b="1" dirty="0" err="1" smtClean="0"/>
-              <a:t>sistem</a:t>
-            </a:r>
-            <a:r>
-              <a:rPr kumimoji="0" lang="en-US" altLang="en-US" sz="2200" b="1" dirty="0" smtClean="0"/>
-              <a:t> </a:t>
-            </a:r>
-            <a:r>
-              <a:rPr kumimoji="0" lang="en-US" altLang="en-US" sz="2200" b="1" dirty="0" err="1" smtClean="0"/>
-              <a:t>informasi</a:t>
-            </a:r>
-            <a:r>
-              <a:rPr kumimoji="0" lang="en-US" altLang="en-US" sz="2200" b="1" dirty="0" smtClean="0"/>
-              <a:t> </a:t>
-            </a:r>
-            <a:r>
-              <a:rPr kumimoji="0" lang="en-US" altLang="en-US" sz="2200" b="1" dirty="0" err="1" smtClean="0"/>
-              <a:t>pada</a:t>
-            </a:r>
-            <a:r>
-              <a:rPr kumimoji="0" lang="en-US" altLang="en-US" sz="2200" b="1" dirty="0" smtClean="0"/>
-              <a:t> sub-</a:t>
-            </a:r>
-            <a:r>
-              <a:rPr kumimoji="0" lang="en-US" altLang="en-US" sz="2200" b="1" dirty="0" err="1" smtClean="0"/>
-              <a:t>sistem</a:t>
-            </a:r>
-            <a:endParaRPr kumimoji="0" lang="en-US" altLang="en-US" sz="2200" b="1" dirty="0"/>
-          </a:p>
-        </p:txBody>
-      </p:sp>
       <p:pic>
         <p:nvPicPr>
           <p:cNvPr id="3" name="Picture 2"/>
@@ -34084,7 +32061,7 @@
           <p:nvPr/>
         </p:nvPicPr>
         <p:blipFill>
-          <a:blip r:embed="rId22"/>
+          <a:blip r:embed="rId20"/>
           <a:stretch>
             <a:fillRect/>
           </a:stretch>
@@ -34109,6 +32086,105 @@
           </a:effectLst>
         </p:spPr>
       </p:pic>
+      <p:sp>
+        <p:nvSpPr>
+          <p:cNvPr id="119" name="Oval 118"/>
+          <p:cNvSpPr/>
+          <p:nvPr/>
+        </p:nvSpPr>
+        <p:spPr>
+          <a:xfrm>
+            <a:off x="4887350" y="4847495"/>
+            <a:ext cx="193775" cy="167874"/>
+          </a:xfrm>
+          <a:prstGeom prst="ellipse">
+            <a:avLst/>
+          </a:prstGeom>
+          <a:solidFill>
+            <a:schemeClr val="bg1">
+              <a:lumMod val="50000"/>
+            </a:schemeClr>
+          </a:solidFill>
+          <a:ln w="19050">
+            <a:solidFill>
+              <a:schemeClr val="tx1"/>
+            </a:solidFill>
+          </a:ln>
+        </p:spPr>
+        <p:style>
+          <a:lnRef idx="2">
+            <a:schemeClr val="accent1">
+              <a:shade val="50000"/>
+            </a:schemeClr>
+          </a:lnRef>
+          <a:fillRef idx="1">
+            <a:schemeClr val="accent1"/>
+          </a:fillRef>
+          <a:effectRef idx="0">
+            <a:schemeClr val="accent1"/>
+          </a:effectRef>
+          <a:fontRef idx="minor">
+            <a:schemeClr val="lt1"/>
+          </a:fontRef>
+        </p:style>
+        <p:txBody>
+          <a:bodyPr rtlCol="0" anchor="ctr"/>
+          <a:lstStyle/>
+          <a:p>
+            <a:pPr algn="ctr"/>
+            <a:endParaRPr kumimoji="1" lang="en-US" sz="1400" dirty="0" err="1" smtClean="0">
+              <a:solidFill>
+                <a:schemeClr val="tx1"/>
+              </a:solidFill>
+              <a:latin typeface="Verdana" panose="020B0604030504040204" pitchFamily="34" charset="0"/>
+              <a:ea typeface="Verdana" panose="020B0604030504040204" pitchFamily="34" charset="0"/>
+              <a:cs typeface="Verdana" panose="020B0604030504040204" pitchFamily="34" charset="0"/>
+            </a:endParaRPr>
+          </a:p>
+        </p:txBody>
+      </p:sp>
+      <p:cxnSp>
+        <p:nvCxnSpPr>
+          <p:cNvPr id="122" name="Elbow Connector 121"/>
+          <p:cNvCxnSpPr>
+            <a:stCxn id="3" idx="2"/>
+            <a:endCxn id="119" idx="0"/>
+          </p:cNvCxnSpPr>
+          <p:nvPr/>
+        </p:nvCxnSpPr>
+        <p:spPr>
+          <a:xfrm rot="5400000">
+            <a:off x="4788625" y="4616204"/>
+            <a:ext cx="426904" cy="35678"/>
+          </a:xfrm>
+          <a:prstGeom prst="bentConnector3">
+            <a:avLst>
+              <a:gd name="adj1" fmla="val 50000"/>
+            </a:avLst>
+          </a:prstGeom>
+          <a:ln w="38100">
+            <a:solidFill>
+              <a:schemeClr val="tx2">
+                <a:lumMod val="75000"/>
+              </a:schemeClr>
+            </a:solidFill>
+          </a:ln>
+        </p:spPr>
+        <p:style>
+          <a:lnRef idx="1">
+            <a:schemeClr val="accent1"/>
+          </a:lnRef>
+          <a:fillRef idx="0">
+            <a:schemeClr val="accent1"/>
+          </a:fillRef>
+          <a:effectRef idx="0">
+            <a:schemeClr val="accent1"/>
+          </a:effectRef>
+          <a:fontRef idx="minor">
+            <a:schemeClr val="tx1"/>
+          </a:fontRef>
+        </p:style>
+      </p:cxnSp>
     </p:spTree>
     <p:extLst>
       <p:ext uri="{BB962C8B-B14F-4D97-AF65-F5344CB8AC3E}">

</xml_diff>